<commit_message>
Added dark theme and transparent logo to powerpoint qbio template
* added more logos and a dark themed slide if we need them, as well as some mostly-colorblind safe palettes
</commit_message>
<xml_diff>
--- a/templates/qbio_template.pptx
+++ b/templates/qbio_template.pptx
@@ -13,6 +13,7 @@
     <p:sldId id="262" r:id="rId7"/>
     <p:sldId id="263" r:id="rId8"/>
     <p:sldId id="257" r:id="rId9"/>
+    <p:sldId id="264" r:id="rId10"/>
   </p:sldIdLst>
   <p:sldSz cx="12192000" cy="6858000"/>
   <p:notesSz cx="6858000" cy="9144000"/>
@@ -266,7 +267,7 @@
           <a:p>
             <a:fld id="{0BBBC319-22AA-2A42-AC60-5E515AE3E203}" type="datetimeFigureOut">
               <a:rPr lang="en-US" smtClean="0"/>
-              <a:t>5/13/21</a:t>
+              <a:t>5/17/2021</a:t>
             </a:fld>
             <a:endParaRPr lang="en-US"/>
           </a:p>
@@ -464,7 +465,7 @@
           <a:p>
             <a:fld id="{0BBBC319-22AA-2A42-AC60-5E515AE3E203}" type="datetimeFigureOut">
               <a:rPr lang="en-US" smtClean="0"/>
-              <a:t>5/13/21</a:t>
+              <a:t>5/17/2021</a:t>
             </a:fld>
             <a:endParaRPr lang="en-US"/>
           </a:p>
@@ -672,7 +673,7 @@
           <a:p>
             <a:fld id="{0BBBC319-22AA-2A42-AC60-5E515AE3E203}" type="datetimeFigureOut">
               <a:rPr lang="en-US" smtClean="0"/>
-              <a:t>5/13/21</a:t>
+              <a:t>5/17/2021</a:t>
             </a:fld>
             <a:endParaRPr lang="en-US"/>
           </a:p>
@@ -870,7 +871,7 @@
           <a:p>
             <a:fld id="{0BBBC319-22AA-2A42-AC60-5E515AE3E203}" type="datetimeFigureOut">
               <a:rPr lang="en-US" smtClean="0"/>
-              <a:t>5/13/21</a:t>
+              <a:t>5/17/2021</a:t>
             </a:fld>
             <a:endParaRPr lang="en-US"/>
           </a:p>
@@ -1145,7 +1146,7 @@
           <a:p>
             <a:fld id="{0BBBC319-22AA-2A42-AC60-5E515AE3E203}" type="datetimeFigureOut">
               <a:rPr lang="en-US" smtClean="0"/>
-              <a:t>5/13/21</a:t>
+              <a:t>5/17/2021</a:t>
             </a:fld>
             <a:endParaRPr lang="en-US"/>
           </a:p>
@@ -1410,7 +1411,7 @@
           <a:p>
             <a:fld id="{0BBBC319-22AA-2A42-AC60-5E515AE3E203}" type="datetimeFigureOut">
               <a:rPr lang="en-US" smtClean="0"/>
-              <a:t>5/13/21</a:t>
+              <a:t>5/17/2021</a:t>
             </a:fld>
             <a:endParaRPr lang="en-US"/>
           </a:p>
@@ -1822,7 +1823,7 @@
           <a:p>
             <a:fld id="{0BBBC319-22AA-2A42-AC60-5E515AE3E203}" type="datetimeFigureOut">
               <a:rPr lang="en-US" smtClean="0"/>
-              <a:t>5/13/21</a:t>
+              <a:t>5/17/2021</a:t>
             </a:fld>
             <a:endParaRPr lang="en-US"/>
           </a:p>
@@ -1963,7 +1964,7 @@
           <a:p>
             <a:fld id="{0BBBC319-22AA-2A42-AC60-5E515AE3E203}" type="datetimeFigureOut">
               <a:rPr lang="en-US" smtClean="0"/>
-              <a:t>5/13/21</a:t>
+              <a:t>5/17/2021</a:t>
             </a:fld>
             <a:endParaRPr lang="en-US"/>
           </a:p>
@@ -2076,7 +2077,7 @@
           <a:p>
             <a:fld id="{0BBBC319-22AA-2A42-AC60-5E515AE3E203}" type="datetimeFigureOut">
               <a:rPr lang="en-US" smtClean="0"/>
-              <a:t>5/13/21</a:t>
+              <a:t>5/17/2021</a:t>
             </a:fld>
             <a:endParaRPr lang="en-US"/>
           </a:p>
@@ -2387,7 +2388,7 @@
           <a:p>
             <a:fld id="{0BBBC319-22AA-2A42-AC60-5E515AE3E203}" type="datetimeFigureOut">
               <a:rPr lang="en-US" smtClean="0"/>
-              <a:t>5/13/21</a:t>
+              <a:t>5/17/2021</a:t>
             </a:fld>
             <a:endParaRPr lang="en-US"/>
           </a:p>
@@ -2675,7 +2676,7 @@
           <a:p>
             <a:fld id="{0BBBC319-22AA-2A42-AC60-5E515AE3E203}" type="datetimeFigureOut">
               <a:rPr lang="en-US" smtClean="0"/>
-              <a:t>5/13/21</a:t>
+              <a:t>5/17/2021</a:t>
             </a:fld>
             <a:endParaRPr lang="en-US"/>
           </a:p>
@@ -2916,7 +2917,7 @@
           <a:p>
             <a:fld id="{0BBBC319-22AA-2A42-AC60-5E515AE3E203}" type="datetimeFigureOut">
               <a:rPr lang="en-US" smtClean="0"/>
-              <a:t>5/13/21</a:t>
+              <a:t>5/17/2021</a:t>
             </a:fld>
             <a:endParaRPr lang="en-US"/>
           </a:p>
@@ -6933,10 +6934,10 @@
       </p:grpSpPr>
       <p:sp>
         <p:nvSpPr>
-          <p:cNvPr id="2" name="Rectangle 1">
-            <a:extLst>
-              <a:ext uri="{FF2B5EF4-FFF2-40B4-BE49-F238E27FC236}">
-                <a16:creationId xmlns:a16="http://schemas.microsoft.com/office/drawing/2014/main" id="{BE29CBF1-0999-934D-9DE2-A920C68E8D03}"/>
+          <p:cNvPr id="13" name="Rectangle 12">
+            <a:extLst>
+              <a:ext uri="{FF2B5EF4-FFF2-40B4-BE49-F238E27FC236}">
+                <a16:creationId xmlns:a16="http://schemas.microsoft.com/office/drawing/2014/main" id="{80EA4E08-4F88-4B75-BDFB-5879CDA5FA67}"/>
               </a:ext>
             </a:extLst>
           </p:cNvPr>
@@ -6945,89 +6946,14 @@
         </p:nvSpPr>
         <p:spPr>
           <a:xfrm>
-            <a:off x="150742" y="210907"/>
-            <a:ext cx="11890515" cy="461665"/>
+            <a:off x="8839200" y="1231900"/>
+            <a:ext cx="1275802" cy="979423"/>
           </a:xfrm>
           <a:prstGeom prst="rect">
             <a:avLst/>
           </a:prstGeom>
-        </p:spPr>
-        <p:txBody>
-          <a:bodyPr wrap="square">
-            <a:spAutoFit/>
-          </a:bodyPr>
-          <a:lstStyle/>
-          <a:p>
-            <a:r>
-              <a:rPr lang="en-US" sz="2400" b="1" dirty="0">
-                <a:solidFill>
-                  <a:srgbClr val="0D5427"/>
-                </a:solidFill>
-                <a:latin typeface="Arial Nova" panose="020B0504020202020204" pitchFamily="34" charset="0"/>
-              </a:rPr>
-              <a:t>Bootcamp Basics to get Started with Scientific Computing in Python </a:t>
-            </a:r>
-            <a:endParaRPr lang="en-US" sz="1600" dirty="0">
-              <a:solidFill>
-                <a:srgbClr val="0D5427"/>
-              </a:solidFill>
-              <a:latin typeface="Arial Nova" panose="020B0504020202020204" pitchFamily="34" charset="0"/>
-            </a:endParaRPr>
-          </a:p>
-        </p:txBody>
-      </p:sp>
-      <p:pic>
-        <p:nvPicPr>
-          <p:cNvPr id="5" name="Picture 4">
-            <a:extLst>
-              <a:ext uri="{FF2B5EF4-FFF2-40B4-BE49-F238E27FC236}">
-                <a16:creationId xmlns:a16="http://schemas.microsoft.com/office/drawing/2014/main" id="{4934A38C-41E7-F34D-9F1E-FAA14A1CE066}"/>
-              </a:ext>
-            </a:extLst>
-          </p:cNvPr>
-          <p:cNvPicPr>
-            <a:picLocks noChangeAspect="1"/>
-          </p:cNvPicPr>
-          <p:nvPr/>
-        </p:nvPicPr>
-        <p:blipFill>
-          <a:blip r:embed="rId2"/>
-          <a:stretch>
-            <a:fillRect/>
-          </a:stretch>
-        </p:blipFill>
-        <p:spPr>
-          <a:xfrm>
-            <a:off x="10411405" y="206653"/>
-            <a:ext cx="1479110" cy="465919"/>
-          </a:xfrm>
-          <a:prstGeom prst="rect">
-            <a:avLst/>
-          </a:prstGeom>
-        </p:spPr>
-      </p:pic>
-      <p:sp>
-        <p:nvSpPr>
-          <p:cNvPr id="6" name="Rounded Rectangle 5">
-            <a:extLst>
-              <a:ext uri="{FF2B5EF4-FFF2-40B4-BE49-F238E27FC236}">
-                <a16:creationId xmlns:a16="http://schemas.microsoft.com/office/drawing/2014/main" id="{D417003F-7960-F14A-99DE-574BCA69C207}"/>
-              </a:ext>
-            </a:extLst>
-          </p:cNvPr>
-          <p:cNvSpPr/>
-          <p:nvPr/>
-        </p:nvSpPr>
-        <p:spPr>
-          <a:xfrm>
-            <a:off x="150742" y="672572"/>
-            <a:ext cx="9947415" cy="45719"/>
-          </a:xfrm>
-          <a:prstGeom prst="roundRect">
-            <a:avLst/>
-          </a:prstGeom>
           <a:solidFill>
-            <a:srgbClr val="0D5427"/>
+            <a:srgbClr val="F4EDDA"/>
           </a:solidFill>
         </p:spPr>
         <p:style>
@@ -7055,10 +6981,2164 @@
           </a:p>
         </p:txBody>
       </p:sp>
+      <p:sp>
+        <p:nvSpPr>
+          <p:cNvPr id="2" name="Rectangle 1">
+            <a:extLst>
+              <a:ext uri="{FF2B5EF4-FFF2-40B4-BE49-F238E27FC236}">
+                <a16:creationId xmlns:a16="http://schemas.microsoft.com/office/drawing/2014/main" id="{BE29CBF1-0999-934D-9DE2-A920C68E8D03}"/>
+              </a:ext>
+            </a:extLst>
+          </p:cNvPr>
+          <p:cNvSpPr/>
+          <p:nvPr/>
+        </p:nvSpPr>
+        <p:spPr>
+          <a:xfrm>
+            <a:off x="0" y="48338"/>
+            <a:ext cx="11890515" cy="584775"/>
+          </a:xfrm>
+          <a:prstGeom prst="rect">
+            <a:avLst/>
+          </a:prstGeom>
+        </p:spPr>
+        <p:txBody>
+          <a:bodyPr wrap="square">
+            <a:spAutoFit/>
+          </a:bodyPr>
+          <a:lstStyle/>
+          <a:p>
+            <a:r>
+              <a:rPr lang="en-US" sz="3200" b="1" dirty="0">
+                <a:solidFill>
+                  <a:srgbClr val="0D5427"/>
+                </a:solidFill>
+                <a:latin typeface="Arial Nova" panose="020B0504020202020204" pitchFamily="34" charset="0"/>
+              </a:rPr>
+              <a:t>Title</a:t>
+            </a:r>
+            <a:endParaRPr lang="en-US" sz="1600" dirty="0">
+              <a:solidFill>
+                <a:srgbClr val="0D5427"/>
+              </a:solidFill>
+              <a:latin typeface="Arial Nova" panose="020B0504020202020204" pitchFamily="34" charset="0"/>
+            </a:endParaRPr>
+          </a:p>
+        </p:txBody>
+      </p:sp>
+      <p:pic>
+        <p:nvPicPr>
+          <p:cNvPr id="5" name="Picture 4">
+            <a:extLst>
+              <a:ext uri="{FF2B5EF4-FFF2-40B4-BE49-F238E27FC236}">
+                <a16:creationId xmlns:a16="http://schemas.microsoft.com/office/drawing/2014/main" id="{4934A38C-41E7-F34D-9F1E-FAA14A1CE066}"/>
+              </a:ext>
+            </a:extLst>
+          </p:cNvPr>
+          <p:cNvPicPr>
+            <a:picLocks noChangeAspect="1"/>
+          </p:cNvPicPr>
+          <p:nvPr/>
+        </p:nvPicPr>
+        <p:blipFill>
+          <a:blip r:embed="rId2"/>
+          <a:stretch>
+            <a:fillRect/>
+          </a:stretch>
+        </p:blipFill>
+        <p:spPr>
+          <a:xfrm>
+            <a:off x="10235560" y="65922"/>
+            <a:ext cx="1758222" cy="553839"/>
+          </a:xfrm>
+          <a:prstGeom prst="rect">
+            <a:avLst/>
+          </a:prstGeom>
+        </p:spPr>
+      </p:pic>
+      <p:sp>
+        <p:nvSpPr>
+          <p:cNvPr id="6" name="Rounded Rectangle 5">
+            <a:extLst>
+              <a:ext uri="{FF2B5EF4-FFF2-40B4-BE49-F238E27FC236}">
+                <a16:creationId xmlns:a16="http://schemas.microsoft.com/office/drawing/2014/main" id="{D417003F-7960-F14A-99DE-574BCA69C207}"/>
+              </a:ext>
+            </a:extLst>
+          </p:cNvPr>
+          <p:cNvSpPr/>
+          <p:nvPr/>
+        </p:nvSpPr>
+        <p:spPr>
+          <a:xfrm>
+            <a:off x="103267" y="663780"/>
+            <a:ext cx="11871738" cy="45719"/>
+          </a:xfrm>
+          <a:prstGeom prst="roundRect">
+            <a:avLst/>
+          </a:prstGeom>
+          <a:solidFill>
+            <a:srgbClr val="0D5427"/>
+          </a:solidFill>
+          <a:ln>
+            <a:solidFill>
+              <a:srgbClr val="0D5427"/>
+            </a:solidFill>
+          </a:ln>
+        </p:spPr>
+        <p:style>
+          <a:lnRef idx="2">
+            <a:schemeClr val="accent1">
+              <a:shade val="50000"/>
+            </a:schemeClr>
+          </a:lnRef>
+          <a:fillRef idx="1">
+            <a:schemeClr val="accent1"/>
+          </a:fillRef>
+          <a:effectRef idx="0">
+            <a:schemeClr val="accent1"/>
+          </a:effectRef>
+          <a:fontRef idx="minor">
+            <a:schemeClr val="lt1"/>
+          </a:fontRef>
+        </p:style>
+        <p:txBody>
+          <a:bodyPr rtlCol="0" anchor="ctr"/>
+          <a:lstStyle/>
+          <a:p>
+            <a:pPr algn="ctr"/>
+            <a:endParaRPr lang="en-US">
+              <a:solidFill>
+                <a:srgbClr val="0D5427"/>
+              </a:solidFill>
+            </a:endParaRPr>
+          </a:p>
+        </p:txBody>
+      </p:sp>
+      <p:sp>
+        <p:nvSpPr>
+          <p:cNvPr id="7" name="Rectangle 6">
+            <a:extLst>
+              <a:ext uri="{FF2B5EF4-FFF2-40B4-BE49-F238E27FC236}">
+                <a16:creationId xmlns:a16="http://schemas.microsoft.com/office/drawing/2014/main" id="{ED3371D4-399C-4536-891A-01B2862ACA10}"/>
+              </a:ext>
+            </a:extLst>
+          </p:cNvPr>
+          <p:cNvSpPr/>
+          <p:nvPr/>
+        </p:nvSpPr>
+        <p:spPr>
+          <a:xfrm>
+            <a:off x="122045" y="816350"/>
+            <a:ext cx="1577446" cy="5943615"/>
+          </a:xfrm>
+          <a:prstGeom prst="rect">
+            <a:avLst/>
+          </a:prstGeom>
+          <a:solidFill>
+            <a:schemeClr val="accent4">
+              <a:lumMod val="20000"/>
+              <a:lumOff val="80000"/>
+              <a:alpha val="50000"/>
+            </a:schemeClr>
+          </a:solidFill>
+          <a:ln w="22225" cmpd="sng">
+            <a:solidFill>
+              <a:srgbClr val="13582C">
+                <a:alpha val="99000"/>
+              </a:srgbClr>
+            </a:solidFill>
+            <a:extLst>
+              <a:ext uri="{C807C97D-BFC1-408E-A445-0C87EB9F89A2}">
+                <ask:lineSketchStyleProps xmlns:ask="http://schemas.microsoft.com/office/drawing/2018/sketchyshapes" sd="1219033472">
+                  <a:custGeom>
+                    <a:avLst/>
+                    <a:gdLst>
+                      <a:gd name="connsiteX0" fmla="*/ 0 w 2116836"/>
+                      <a:gd name="connsiteY0" fmla="*/ 0 h 6261206"/>
+                      <a:gd name="connsiteX1" fmla="*/ 550377 w 2116836"/>
+                      <a:gd name="connsiteY1" fmla="*/ 0 h 6261206"/>
+                      <a:gd name="connsiteX2" fmla="*/ 1058418 w 2116836"/>
+                      <a:gd name="connsiteY2" fmla="*/ 0 h 6261206"/>
+                      <a:gd name="connsiteX3" fmla="*/ 1587627 w 2116836"/>
+                      <a:gd name="connsiteY3" fmla="*/ 0 h 6261206"/>
+                      <a:gd name="connsiteX4" fmla="*/ 2116836 w 2116836"/>
+                      <a:gd name="connsiteY4" fmla="*/ 0 h 6261206"/>
+                      <a:gd name="connsiteX5" fmla="*/ 2116836 w 2116836"/>
+                      <a:gd name="connsiteY5" fmla="*/ 443976 h 6261206"/>
+                      <a:gd name="connsiteX6" fmla="*/ 2116836 w 2116836"/>
+                      <a:gd name="connsiteY6" fmla="*/ 825341 h 6261206"/>
+                      <a:gd name="connsiteX7" fmla="*/ 2116836 w 2116836"/>
+                      <a:gd name="connsiteY7" fmla="*/ 1269317 h 6261206"/>
+                      <a:gd name="connsiteX8" fmla="*/ 2116836 w 2116836"/>
+                      <a:gd name="connsiteY8" fmla="*/ 1775906 h 6261206"/>
+                      <a:gd name="connsiteX9" fmla="*/ 2116836 w 2116836"/>
+                      <a:gd name="connsiteY9" fmla="*/ 2345106 h 6261206"/>
+                      <a:gd name="connsiteX10" fmla="*/ 2116836 w 2116836"/>
+                      <a:gd name="connsiteY10" fmla="*/ 2789083 h 6261206"/>
+                      <a:gd name="connsiteX11" fmla="*/ 2116836 w 2116836"/>
+                      <a:gd name="connsiteY11" fmla="*/ 3483507 h 6261206"/>
+                      <a:gd name="connsiteX12" fmla="*/ 2116836 w 2116836"/>
+                      <a:gd name="connsiteY12" fmla="*/ 4052708 h 6261206"/>
+                      <a:gd name="connsiteX13" fmla="*/ 2116836 w 2116836"/>
+                      <a:gd name="connsiteY13" fmla="*/ 4747133 h 6261206"/>
+                      <a:gd name="connsiteX14" fmla="*/ 2116836 w 2116836"/>
+                      <a:gd name="connsiteY14" fmla="*/ 5378945 h 6261206"/>
+                      <a:gd name="connsiteX15" fmla="*/ 2116836 w 2116836"/>
+                      <a:gd name="connsiteY15" fmla="*/ 6261206 h 6261206"/>
+                      <a:gd name="connsiteX16" fmla="*/ 1566459 w 2116836"/>
+                      <a:gd name="connsiteY16" fmla="*/ 6261206 h 6261206"/>
+                      <a:gd name="connsiteX17" fmla="*/ 1016081 w 2116836"/>
+                      <a:gd name="connsiteY17" fmla="*/ 6261206 h 6261206"/>
+                      <a:gd name="connsiteX18" fmla="*/ 486872 w 2116836"/>
+                      <a:gd name="connsiteY18" fmla="*/ 6261206 h 6261206"/>
+                      <a:gd name="connsiteX19" fmla="*/ 0 w 2116836"/>
+                      <a:gd name="connsiteY19" fmla="*/ 6261206 h 6261206"/>
+                      <a:gd name="connsiteX20" fmla="*/ 0 w 2116836"/>
+                      <a:gd name="connsiteY20" fmla="*/ 5566781 h 6261206"/>
+                      <a:gd name="connsiteX21" fmla="*/ 0 w 2116836"/>
+                      <a:gd name="connsiteY21" fmla="*/ 4872357 h 6261206"/>
+                      <a:gd name="connsiteX22" fmla="*/ 0 w 2116836"/>
+                      <a:gd name="connsiteY22" fmla="*/ 4303156 h 6261206"/>
+                      <a:gd name="connsiteX23" fmla="*/ 0 w 2116836"/>
+                      <a:gd name="connsiteY23" fmla="*/ 3671344 h 6261206"/>
+                      <a:gd name="connsiteX24" fmla="*/ 0 w 2116836"/>
+                      <a:gd name="connsiteY24" fmla="*/ 3102143 h 6261206"/>
+                      <a:gd name="connsiteX25" fmla="*/ 0 w 2116836"/>
+                      <a:gd name="connsiteY25" fmla="*/ 2532942 h 6261206"/>
+                      <a:gd name="connsiteX26" fmla="*/ 0 w 2116836"/>
+                      <a:gd name="connsiteY26" fmla="*/ 1963742 h 6261206"/>
+                      <a:gd name="connsiteX27" fmla="*/ 0 w 2116836"/>
+                      <a:gd name="connsiteY27" fmla="*/ 1582378 h 6261206"/>
+                      <a:gd name="connsiteX28" fmla="*/ 0 w 2116836"/>
+                      <a:gd name="connsiteY28" fmla="*/ 950565 h 6261206"/>
+                      <a:gd name="connsiteX29" fmla="*/ 0 w 2116836"/>
+                      <a:gd name="connsiteY29" fmla="*/ 569201 h 6261206"/>
+                      <a:gd name="connsiteX30" fmla="*/ 0 w 2116836"/>
+                      <a:gd name="connsiteY30" fmla="*/ 0 h 6261206"/>
+                    </a:gdLst>
+                    <a:ahLst/>
+                    <a:cxnLst>
+                      <a:cxn ang="0">
+                        <a:pos x="connsiteX0" y="connsiteY0"/>
+                      </a:cxn>
+                      <a:cxn ang="0">
+                        <a:pos x="connsiteX1" y="connsiteY1"/>
+                      </a:cxn>
+                      <a:cxn ang="0">
+                        <a:pos x="connsiteX2" y="connsiteY2"/>
+                      </a:cxn>
+                      <a:cxn ang="0">
+                        <a:pos x="connsiteX3" y="connsiteY3"/>
+                      </a:cxn>
+                      <a:cxn ang="0">
+                        <a:pos x="connsiteX4" y="connsiteY4"/>
+                      </a:cxn>
+                      <a:cxn ang="0">
+                        <a:pos x="connsiteX5" y="connsiteY5"/>
+                      </a:cxn>
+                      <a:cxn ang="0">
+                        <a:pos x="connsiteX6" y="connsiteY6"/>
+                      </a:cxn>
+                      <a:cxn ang="0">
+                        <a:pos x="connsiteX7" y="connsiteY7"/>
+                      </a:cxn>
+                      <a:cxn ang="0">
+                        <a:pos x="connsiteX8" y="connsiteY8"/>
+                      </a:cxn>
+                      <a:cxn ang="0">
+                        <a:pos x="connsiteX9" y="connsiteY9"/>
+                      </a:cxn>
+                      <a:cxn ang="0">
+                        <a:pos x="connsiteX10" y="connsiteY10"/>
+                      </a:cxn>
+                      <a:cxn ang="0">
+                        <a:pos x="connsiteX11" y="connsiteY11"/>
+                      </a:cxn>
+                      <a:cxn ang="0">
+                        <a:pos x="connsiteX12" y="connsiteY12"/>
+                      </a:cxn>
+                      <a:cxn ang="0">
+                        <a:pos x="connsiteX13" y="connsiteY13"/>
+                      </a:cxn>
+                      <a:cxn ang="0">
+                        <a:pos x="connsiteX14" y="connsiteY14"/>
+                      </a:cxn>
+                      <a:cxn ang="0">
+                        <a:pos x="connsiteX15" y="connsiteY15"/>
+                      </a:cxn>
+                      <a:cxn ang="0">
+                        <a:pos x="connsiteX16" y="connsiteY16"/>
+                      </a:cxn>
+                      <a:cxn ang="0">
+                        <a:pos x="connsiteX17" y="connsiteY17"/>
+                      </a:cxn>
+                      <a:cxn ang="0">
+                        <a:pos x="connsiteX18" y="connsiteY18"/>
+                      </a:cxn>
+                      <a:cxn ang="0">
+                        <a:pos x="connsiteX19" y="connsiteY19"/>
+                      </a:cxn>
+                      <a:cxn ang="0">
+                        <a:pos x="connsiteX20" y="connsiteY20"/>
+                      </a:cxn>
+                      <a:cxn ang="0">
+                        <a:pos x="connsiteX21" y="connsiteY21"/>
+                      </a:cxn>
+                      <a:cxn ang="0">
+                        <a:pos x="connsiteX22" y="connsiteY22"/>
+                      </a:cxn>
+                      <a:cxn ang="0">
+                        <a:pos x="connsiteX23" y="connsiteY23"/>
+                      </a:cxn>
+                      <a:cxn ang="0">
+                        <a:pos x="connsiteX24" y="connsiteY24"/>
+                      </a:cxn>
+                      <a:cxn ang="0">
+                        <a:pos x="connsiteX25" y="connsiteY25"/>
+                      </a:cxn>
+                      <a:cxn ang="0">
+                        <a:pos x="connsiteX26" y="connsiteY26"/>
+                      </a:cxn>
+                      <a:cxn ang="0">
+                        <a:pos x="connsiteX27" y="connsiteY27"/>
+                      </a:cxn>
+                      <a:cxn ang="0">
+                        <a:pos x="connsiteX28" y="connsiteY28"/>
+                      </a:cxn>
+                      <a:cxn ang="0">
+                        <a:pos x="connsiteX29" y="connsiteY29"/>
+                      </a:cxn>
+                      <a:cxn ang="0">
+                        <a:pos x="connsiteX30" y="connsiteY30"/>
+                      </a:cxn>
+                    </a:cxnLst>
+                    <a:rect l="l" t="t" r="r" b="b"/>
+                    <a:pathLst>
+                      <a:path w="2116836" h="6261206" fill="none" extrusionOk="0">
+                        <a:moveTo>
+                          <a:pt x="0" y="0"/>
+                        </a:moveTo>
+                        <a:cubicBezTo>
+                          <a:pt x="225918" y="-34016"/>
+                          <a:pt x="395079" y="44159"/>
+                          <a:pt x="550377" y="0"/>
+                        </a:cubicBezTo>
+                        <a:cubicBezTo>
+                          <a:pt x="705675" y="-44159"/>
+                          <a:pt x="925264" y="18151"/>
+                          <a:pt x="1058418" y="0"/>
+                        </a:cubicBezTo>
+                        <a:cubicBezTo>
+                          <a:pt x="1191572" y="-18151"/>
+                          <a:pt x="1363242" y="33856"/>
+                          <a:pt x="1587627" y="0"/>
+                        </a:cubicBezTo>
+                        <a:cubicBezTo>
+                          <a:pt x="1812012" y="-33856"/>
+                          <a:pt x="1878985" y="29310"/>
+                          <a:pt x="2116836" y="0"/>
+                        </a:cubicBezTo>
+                        <a:cubicBezTo>
+                          <a:pt x="2159368" y="204024"/>
+                          <a:pt x="2101610" y="287280"/>
+                          <a:pt x="2116836" y="443976"/>
+                        </a:cubicBezTo>
+                        <a:cubicBezTo>
+                          <a:pt x="2132062" y="600672"/>
+                          <a:pt x="2115766" y="667996"/>
+                          <a:pt x="2116836" y="825341"/>
+                        </a:cubicBezTo>
+                        <a:cubicBezTo>
+                          <a:pt x="2117906" y="982686"/>
+                          <a:pt x="2077803" y="1120058"/>
+                          <a:pt x="2116836" y="1269317"/>
+                        </a:cubicBezTo>
+                        <a:cubicBezTo>
+                          <a:pt x="2155869" y="1418576"/>
+                          <a:pt x="2114106" y="1588629"/>
+                          <a:pt x="2116836" y="1775906"/>
+                        </a:cubicBezTo>
+                        <a:cubicBezTo>
+                          <a:pt x="2119566" y="1963183"/>
+                          <a:pt x="2101020" y="2128890"/>
+                          <a:pt x="2116836" y="2345106"/>
+                        </a:cubicBezTo>
+                        <a:cubicBezTo>
+                          <a:pt x="2132652" y="2561322"/>
+                          <a:pt x="2115868" y="2574478"/>
+                          <a:pt x="2116836" y="2789083"/>
+                        </a:cubicBezTo>
+                        <a:cubicBezTo>
+                          <a:pt x="2117804" y="3003688"/>
+                          <a:pt x="2062089" y="3302658"/>
+                          <a:pt x="2116836" y="3483507"/>
+                        </a:cubicBezTo>
+                        <a:cubicBezTo>
+                          <a:pt x="2171583" y="3664356"/>
+                          <a:pt x="2101663" y="3831819"/>
+                          <a:pt x="2116836" y="4052708"/>
+                        </a:cubicBezTo>
+                        <a:cubicBezTo>
+                          <a:pt x="2132009" y="4273597"/>
+                          <a:pt x="2055702" y="4456217"/>
+                          <a:pt x="2116836" y="4747133"/>
+                        </a:cubicBezTo>
+                        <a:cubicBezTo>
+                          <a:pt x="2177970" y="5038050"/>
+                          <a:pt x="2068871" y="5192335"/>
+                          <a:pt x="2116836" y="5378945"/>
+                        </a:cubicBezTo>
+                        <a:cubicBezTo>
+                          <a:pt x="2164801" y="5565555"/>
+                          <a:pt x="2064795" y="6030993"/>
+                          <a:pt x="2116836" y="6261206"/>
+                        </a:cubicBezTo>
+                        <a:cubicBezTo>
+                          <a:pt x="1928233" y="6278718"/>
+                          <a:pt x="1685770" y="6219426"/>
+                          <a:pt x="1566459" y="6261206"/>
+                        </a:cubicBezTo>
+                        <a:cubicBezTo>
+                          <a:pt x="1447148" y="6302986"/>
+                          <a:pt x="1203439" y="6244651"/>
+                          <a:pt x="1016081" y="6261206"/>
+                        </a:cubicBezTo>
+                        <a:cubicBezTo>
+                          <a:pt x="828723" y="6277761"/>
+                          <a:pt x="593713" y="6201409"/>
+                          <a:pt x="486872" y="6261206"/>
+                        </a:cubicBezTo>
+                        <a:cubicBezTo>
+                          <a:pt x="380031" y="6321003"/>
+                          <a:pt x="120721" y="6219335"/>
+                          <a:pt x="0" y="6261206"/>
+                        </a:cubicBezTo>
+                        <a:cubicBezTo>
+                          <a:pt x="-22346" y="6029246"/>
+                          <a:pt x="71141" y="5860547"/>
+                          <a:pt x="0" y="5566781"/>
+                        </a:cubicBezTo>
+                        <a:cubicBezTo>
+                          <a:pt x="-71141" y="5273016"/>
+                          <a:pt x="69428" y="5078049"/>
+                          <a:pt x="0" y="4872357"/>
+                        </a:cubicBezTo>
+                        <a:cubicBezTo>
+                          <a:pt x="-69428" y="4666665"/>
+                          <a:pt x="63076" y="4570884"/>
+                          <a:pt x="0" y="4303156"/>
+                        </a:cubicBezTo>
+                        <a:cubicBezTo>
+                          <a:pt x="-63076" y="4035428"/>
+                          <a:pt x="32504" y="3819356"/>
+                          <a:pt x="0" y="3671344"/>
+                        </a:cubicBezTo>
+                        <a:cubicBezTo>
+                          <a:pt x="-32504" y="3523332"/>
+                          <a:pt x="17503" y="3348248"/>
+                          <a:pt x="0" y="3102143"/>
+                        </a:cubicBezTo>
+                        <a:cubicBezTo>
+                          <a:pt x="-17503" y="2856038"/>
+                          <a:pt x="21591" y="2763441"/>
+                          <a:pt x="0" y="2532942"/>
+                        </a:cubicBezTo>
+                        <a:cubicBezTo>
+                          <a:pt x="-21591" y="2302443"/>
+                          <a:pt x="68254" y="2235060"/>
+                          <a:pt x="0" y="1963742"/>
+                        </a:cubicBezTo>
+                        <a:cubicBezTo>
+                          <a:pt x="-68254" y="1692424"/>
+                          <a:pt x="10005" y="1754039"/>
+                          <a:pt x="0" y="1582378"/>
+                        </a:cubicBezTo>
+                        <a:cubicBezTo>
+                          <a:pt x="-10005" y="1410717"/>
+                          <a:pt x="60088" y="1252307"/>
+                          <a:pt x="0" y="950565"/>
+                        </a:cubicBezTo>
+                        <a:cubicBezTo>
+                          <a:pt x="-60088" y="648823"/>
+                          <a:pt x="43154" y="738812"/>
+                          <a:pt x="0" y="569201"/>
+                        </a:cubicBezTo>
+                        <a:cubicBezTo>
+                          <a:pt x="-43154" y="399590"/>
+                          <a:pt x="3087" y="259507"/>
+                          <a:pt x="0" y="0"/>
+                        </a:cubicBezTo>
+                        <a:close/>
+                      </a:path>
+                      <a:path w="2116836" h="6261206" stroke="0" extrusionOk="0">
+                        <a:moveTo>
+                          <a:pt x="0" y="0"/>
+                        </a:moveTo>
+                        <a:cubicBezTo>
+                          <a:pt x="194979" y="-17842"/>
+                          <a:pt x="275613" y="24047"/>
+                          <a:pt x="508041" y="0"/>
+                        </a:cubicBezTo>
+                        <a:cubicBezTo>
+                          <a:pt x="740469" y="-24047"/>
+                          <a:pt x="797934" y="16205"/>
+                          <a:pt x="973745" y="0"/>
+                        </a:cubicBezTo>
+                        <a:cubicBezTo>
+                          <a:pt x="1149556" y="-16205"/>
+                          <a:pt x="1311326" y="51706"/>
+                          <a:pt x="1545290" y="0"/>
+                        </a:cubicBezTo>
+                        <a:cubicBezTo>
+                          <a:pt x="1779254" y="-51706"/>
+                          <a:pt x="1839294" y="59057"/>
+                          <a:pt x="2116836" y="0"/>
+                        </a:cubicBezTo>
+                        <a:cubicBezTo>
+                          <a:pt x="2125097" y="190710"/>
+                          <a:pt x="2113017" y="356820"/>
+                          <a:pt x="2116836" y="506588"/>
+                        </a:cubicBezTo>
+                        <a:cubicBezTo>
+                          <a:pt x="2120655" y="656356"/>
+                          <a:pt x="2081267" y="797988"/>
+                          <a:pt x="2116836" y="950565"/>
+                        </a:cubicBezTo>
+                        <a:cubicBezTo>
+                          <a:pt x="2152405" y="1103142"/>
+                          <a:pt x="2084051" y="1404827"/>
+                          <a:pt x="2116836" y="1519765"/>
+                        </a:cubicBezTo>
+                        <a:cubicBezTo>
+                          <a:pt x="2149621" y="1634703"/>
+                          <a:pt x="2108642" y="1816681"/>
+                          <a:pt x="2116836" y="2088966"/>
+                        </a:cubicBezTo>
+                        <a:cubicBezTo>
+                          <a:pt x="2125030" y="2361251"/>
+                          <a:pt x="2083755" y="2326902"/>
+                          <a:pt x="2116836" y="2532942"/>
+                        </a:cubicBezTo>
+                        <a:cubicBezTo>
+                          <a:pt x="2149917" y="2738982"/>
+                          <a:pt x="2084942" y="2880121"/>
+                          <a:pt x="2116836" y="2976919"/>
+                        </a:cubicBezTo>
+                        <a:cubicBezTo>
+                          <a:pt x="2148730" y="3073717"/>
+                          <a:pt x="2066025" y="3261988"/>
+                          <a:pt x="2116836" y="3546119"/>
+                        </a:cubicBezTo>
+                        <a:cubicBezTo>
+                          <a:pt x="2167647" y="3830250"/>
+                          <a:pt x="2056171" y="3975028"/>
+                          <a:pt x="2116836" y="4177932"/>
+                        </a:cubicBezTo>
+                        <a:cubicBezTo>
+                          <a:pt x="2177501" y="4380836"/>
+                          <a:pt x="2110320" y="4401695"/>
+                          <a:pt x="2116836" y="4559296"/>
+                        </a:cubicBezTo>
+                        <a:cubicBezTo>
+                          <a:pt x="2123352" y="4716897"/>
+                          <a:pt x="2106247" y="4909785"/>
+                          <a:pt x="2116836" y="5128497"/>
+                        </a:cubicBezTo>
+                        <a:cubicBezTo>
+                          <a:pt x="2127425" y="5347209"/>
+                          <a:pt x="2070713" y="5463623"/>
+                          <a:pt x="2116836" y="5697697"/>
+                        </a:cubicBezTo>
+                        <a:cubicBezTo>
+                          <a:pt x="2162959" y="5931771"/>
+                          <a:pt x="2065839" y="5991022"/>
+                          <a:pt x="2116836" y="6261206"/>
+                        </a:cubicBezTo>
+                        <a:cubicBezTo>
+                          <a:pt x="1993577" y="6323026"/>
+                          <a:pt x="1833543" y="6207492"/>
+                          <a:pt x="1566459" y="6261206"/>
+                        </a:cubicBezTo>
+                        <a:cubicBezTo>
+                          <a:pt x="1299375" y="6314920"/>
+                          <a:pt x="1184532" y="6197961"/>
+                          <a:pt x="1037250" y="6261206"/>
+                        </a:cubicBezTo>
+                        <a:cubicBezTo>
+                          <a:pt x="889968" y="6324451"/>
+                          <a:pt x="675538" y="6260177"/>
+                          <a:pt x="571546" y="6261206"/>
+                        </a:cubicBezTo>
+                        <a:cubicBezTo>
+                          <a:pt x="467554" y="6262235"/>
+                          <a:pt x="125534" y="6241738"/>
+                          <a:pt x="0" y="6261206"/>
+                        </a:cubicBezTo>
+                        <a:cubicBezTo>
+                          <a:pt x="-57040" y="6099636"/>
+                          <a:pt x="2135" y="5712203"/>
+                          <a:pt x="0" y="5566781"/>
+                        </a:cubicBezTo>
+                        <a:cubicBezTo>
+                          <a:pt x="-2135" y="5421359"/>
+                          <a:pt x="37294" y="5021150"/>
+                          <a:pt x="0" y="4872357"/>
+                        </a:cubicBezTo>
+                        <a:cubicBezTo>
+                          <a:pt x="-37294" y="4723564"/>
+                          <a:pt x="7798" y="4522358"/>
+                          <a:pt x="0" y="4303156"/>
+                        </a:cubicBezTo>
+                        <a:cubicBezTo>
+                          <a:pt x="-7798" y="4083954"/>
+                          <a:pt x="58613" y="4042155"/>
+                          <a:pt x="0" y="3796568"/>
+                        </a:cubicBezTo>
+                        <a:cubicBezTo>
+                          <a:pt x="-58613" y="3550981"/>
+                          <a:pt x="26008" y="3516111"/>
+                          <a:pt x="0" y="3415203"/>
+                        </a:cubicBezTo>
+                        <a:cubicBezTo>
+                          <a:pt x="-26008" y="3314296"/>
+                          <a:pt x="40033" y="3189905"/>
+                          <a:pt x="0" y="3033839"/>
+                        </a:cubicBezTo>
+                        <a:cubicBezTo>
+                          <a:pt x="-40033" y="2877773"/>
+                          <a:pt x="40622" y="2657965"/>
+                          <a:pt x="0" y="2402026"/>
+                        </a:cubicBezTo>
+                        <a:cubicBezTo>
+                          <a:pt x="-40622" y="2146087"/>
+                          <a:pt x="50341" y="2089474"/>
+                          <a:pt x="0" y="1958050"/>
+                        </a:cubicBezTo>
+                        <a:cubicBezTo>
+                          <a:pt x="-50341" y="1826626"/>
+                          <a:pt x="11843" y="1502672"/>
+                          <a:pt x="0" y="1263625"/>
+                        </a:cubicBezTo>
+                        <a:cubicBezTo>
+                          <a:pt x="-11843" y="1024579"/>
+                          <a:pt x="9227" y="897968"/>
+                          <a:pt x="0" y="757037"/>
+                        </a:cubicBezTo>
+                        <a:cubicBezTo>
+                          <a:pt x="-9227" y="616106"/>
+                          <a:pt x="36062" y="292523"/>
+                          <a:pt x="0" y="0"/>
+                        </a:cubicBezTo>
+                        <a:close/>
+                      </a:path>
+                    </a:pathLst>
+                  </a:custGeom>
+                  <ask:type>
+                    <ask:lineSketchNone/>
+                  </ask:type>
+                </ask:lineSketchStyleProps>
+              </a:ext>
+            </a:extLst>
+          </a:ln>
+          <a:effectLst>
+            <a:outerShdw blurRad="50800" dist="38100" dir="2700000" algn="tl" rotWithShape="0">
+              <a:prstClr val="black">
+                <a:alpha val="18000"/>
+              </a:prstClr>
+            </a:outerShdw>
+          </a:effectLst>
+        </p:spPr>
+        <p:style>
+          <a:lnRef idx="0">
+            <a:scrgbClr r="0" g="0" b="0"/>
+          </a:lnRef>
+          <a:fillRef idx="0">
+            <a:scrgbClr r="0" g="0" b="0"/>
+          </a:fillRef>
+          <a:effectRef idx="0">
+            <a:scrgbClr r="0" g="0" b="0"/>
+          </a:effectRef>
+          <a:fontRef idx="minor">
+            <a:schemeClr val="lt1"/>
+          </a:fontRef>
+        </p:style>
+        <p:txBody>
+          <a:bodyPr rtlCol="0" anchor="ctr"/>
+          <a:lstStyle/>
+          <a:p>
+            <a:pPr algn="ctr"/>
+            <a:endParaRPr lang="en-US" b="1" spc="50" dirty="0">
+              <a:ln w="0"/>
+              <a:solidFill>
+                <a:schemeClr val="bg2"/>
+              </a:solidFill>
+              <a:effectLst>
+                <a:innerShdw blurRad="63500" dist="50800" dir="13500000">
+                  <a:srgbClr val="000000">
+                    <a:alpha val="50000"/>
+                  </a:srgbClr>
+                </a:innerShdw>
+              </a:effectLst>
+              <a:latin typeface="Arial Nova" panose="020B0504020202020204" pitchFamily="34" charset="0"/>
+            </a:endParaRPr>
+          </a:p>
+        </p:txBody>
+      </p:sp>
+      <p:sp>
+        <p:nvSpPr>
+          <p:cNvPr id="8" name="Rectangle 7">
+            <a:extLst>
+              <a:ext uri="{FF2B5EF4-FFF2-40B4-BE49-F238E27FC236}">
+                <a16:creationId xmlns:a16="http://schemas.microsoft.com/office/drawing/2014/main" id="{079448C9-2A66-4E3B-AAC2-8BB995AF1DB0}"/>
+              </a:ext>
+            </a:extLst>
+          </p:cNvPr>
+          <p:cNvSpPr/>
+          <p:nvPr/>
+        </p:nvSpPr>
+        <p:spPr>
+          <a:xfrm>
+            <a:off x="122045" y="816350"/>
+            <a:ext cx="1577446" cy="923330"/>
+          </a:xfrm>
+          <a:prstGeom prst="rect">
+            <a:avLst/>
+          </a:prstGeom>
+        </p:spPr>
+        <p:txBody>
+          <a:bodyPr wrap="square">
+            <a:spAutoFit/>
+          </a:bodyPr>
+          <a:lstStyle/>
+          <a:p>
+            <a:r>
+              <a:rPr lang="en-US" sz="1600" i="0" u="none" strike="noStrike" dirty="0">
+                <a:effectLst/>
+                <a:latin typeface="Arial Nova" panose="020F0502020204030204" pitchFamily="34" charset="0"/>
+              </a:rPr>
+              <a:t>Outline</a:t>
+            </a:r>
+          </a:p>
+          <a:p>
+            <a:pPr marL="171450" indent="-171450">
+              <a:buFont typeface="Arial" panose="020B0604020202020204" pitchFamily="34" charset="0"/>
+              <a:buChar char="•"/>
+            </a:pPr>
+            <a:r>
+              <a:rPr lang="en-US" sz="1200" dirty="0">
+                <a:latin typeface="Arial Nova" panose="020F0502020204030204" pitchFamily="34" charset="0"/>
+              </a:rPr>
+              <a:t>Bullet one</a:t>
+            </a:r>
+          </a:p>
+          <a:p>
+            <a:pPr marL="171450" indent="-171450">
+              <a:buFont typeface="Arial" panose="020B0604020202020204" pitchFamily="34" charset="0"/>
+              <a:buChar char="•"/>
+            </a:pPr>
+            <a:r>
+              <a:rPr lang="en-US" sz="1200" dirty="0">
+                <a:latin typeface="Arial Nova" panose="020F0502020204030204" pitchFamily="34" charset="0"/>
+              </a:rPr>
+              <a:t>Bullet 2</a:t>
+            </a:r>
+          </a:p>
+          <a:p>
+            <a:endParaRPr lang="en-US" sz="1400" i="0" u="none" strike="noStrike" dirty="0">
+              <a:effectLst/>
+              <a:latin typeface="Arial Nova" panose="020F0502020204030204" pitchFamily="34" charset="0"/>
+            </a:endParaRPr>
+          </a:p>
+        </p:txBody>
+      </p:sp>
+      <p:sp>
+        <p:nvSpPr>
+          <p:cNvPr id="9" name="Oval 8">
+            <a:extLst>
+              <a:ext uri="{FF2B5EF4-FFF2-40B4-BE49-F238E27FC236}">
+                <a16:creationId xmlns:a16="http://schemas.microsoft.com/office/drawing/2014/main" id="{BB7DFC01-1028-40BA-B8F8-54837B70336B}"/>
+              </a:ext>
+            </a:extLst>
+          </p:cNvPr>
+          <p:cNvSpPr/>
+          <p:nvPr/>
+        </p:nvSpPr>
+        <p:spPr>
+          <a:xfrm>
+            <a:off x="9384205" y="5825920"/>
+            <a:ext cx="736600" cy="736600"/>
+          </a:xfrm>
+          <a:prstGeom prst="ellipse">
+            <a:avLst/>
+          </a:prstGeom>
+          <a:solidFill>
+            <a:srgbClr val="F4EDDA"/>
+          </a:solidFill>
+          <a:ln>
+            <a:solidFill>
+              <a:schemeClr val="tx1">
+                <a:lumMod val="95000"/>
+                <a:lumOff val="5000"/>
+              </a:schemeClr>
+            </a:solidFill>
+          </a:ln>
+        </p:spPr>
+        <p:style>
+          <a:lnRef idx="2">
+            <a:schemeClr val="accent1">
+              <a:shade val="50000"/>
+            </a:schemeClr>
+          </a:lnRef>
+          <a:fillRef idx="1">
+            <a:schemeClr val="accent1"/>
+          </a:fillRef>
+          <a:effectRef idx="0">
+            <a:schemeClr val="accent1"/>
+          </a:effectRef>
+          <a:fontRef idx="minor">
+            <a:schemeClr val="lt1"/>
+          </a:fontRef>
+        </p:style>
+        <p:txBody>
+          <a:bodyPr rtlCol="0" anchor="ctr"/>
+          <a:lstStyle/>
+          <a:p>
+            <a:pPr algn="ctr"/>
+            <a:endParaRPr lang="en-US">
+              <a:solidFill>
+                <a:srgbClr val="72EE7B"/>
+              </a:solidFill>
+            </a:endParaRPr>
+          </a:p>
+        </p:txBody>
+      </p:sp>
+      <p:sp>
+        <p:nvSpPr>
+          <p:cNvPr id="10" name="Oval 9">
+            <a:extLst>
+              <a:ext uri="{FF2B5EF4-FFF2-40B4-BE49-F238E27FC236}">
+                <a16:creationId xmlns:a16="http://schemas.microsoft.com/office/drawing/2014/main" id="{A3B7E43F-5DF0-4788-9D3D-12882A0CB4B5}"/>
+              </a:ext>
+            </a:extLst>
+          </p:cNvPr>
+          <p:cNvSpPr/>
+          <p:nvPr/>
+        </p:nvSpPr>
+        <p:spPr>
+          <a:xfrm>
+            <a:off x="10311305" y="5825920"/>
+            <a:ext cx="736600" cy="736600"/>
+          </a:xfrm>
+          <a:prstGeom prst="ellipse">
+            <a:avLst/>
+          </a:prstGeom>
+          <a:solidFill>
+            <a:srgbClr val="DF1352"/>
+          </a:solidFill>
+          <a:ln>
+            <a:solidFill>
+              <a:schemeClr val="tx1">
+                <a:lumMod val="95000"/>
+                <a:lumOff val="5000"/>
+              </a:schemeClr>
+            </a:solidFill>
+          </a:ln>
+        </p:spPr>
+        <p:style>
+          <a:lnRef idx="2">
+            <a:schemeClr val="accent1">
+              <a:shade val="50000"/>
+            </a:schemeClr>
+          </a:lnRef>
+          <a:fillRef idx="1">
+            <a:schemeClr val="accent1"/>
+          </a:fillRef>
+          <a:effectRef idx="0">
+            <a:schemeClr val="accent1"/>
+          </a:effectRef>
+          <a:fontRef idx="minor">
+            <a:schemeClr val="lt1"/>
+          </a:fontRef>
+        </p:style>
+        <p:txBody>
+          <a:bodyPr rtlCol="0" anchor="ctr"/>
+          <a:lstStyle/>
+          <a:p>
+            <a:pPr algn="ctr"/>
+            <a:endParaRPr lang="en-US"/>
+          </a:p>
+        </p:txBody>
+      </p:sp>
+      <p:sp>
+        <p:nvSpPr>
+          <p:cNvPr id="11" name="Oval 10">
+            <a:extLst>
+              <a:ext uri="{FF2B5EF4-FFF2-40B4-BE49-F238E27FC236}">
+                <a16:creationId xmlns:a16="http://schemas.microsoft.com/office/drawing/2014/main" id="{C47149C5-DEC1-486A-98E0-6E8D9CFC0283}"/>
+              </a:ext>
+            </a:extLst>
+          </p:cNvPr>
+          <p:cNvSpPr/>
+          <p:nvPr/>
+        </p:nvSpPr>
+        <p:spPr>
+          <a:xfrm>
+            <a:off x="11238405" y="5825920"/>
+            <a:ext cx="736600" cy="736600"/>
+          </a:xfrm>
+          <a:prstGeom prst="ellipse">
+            <a:avLst/>
+          </a:prstGeom>
+          <a:solidFill>
+            <a:srgbClr val="22289A"/>
+          </a:solidFill>
+          <a:ln>
+            <a:solidFill>
+              <a:schemeClr val="tx1">
+                <a:lumMod val="95000"/>
+                <a:lumOff val="5000"/>
+              </a:schemeClr>
+            </a:solidFill>
+          </a:ln>
+        </p:spPr>
+        <p:style>
+          <a:lnRef idx="2">
+            <a:schemeClr val="accent1">
+              <a:shade val="50000"/>
+            </a:schemeClr>
+          </a:lnRef>
+          <a:fillRef idx="1">
+            <a:schemeClr val="accent1"/>
+          </a:fillRef>
+          <a:effectRef idx="0">
+            <a:schemeClr val="accent1"/>
+          </a:effectRef>
+          <a:fontRef idx="minor">
+            <a:schemeClr val="lt1"/>
+          </a:fontRef>
+        </p:style>
+        <p:txBody>
+          <a:bodyPr rtlCol="0" anchor="ctr"/>
+          <a:lstStyle/>
+          <a:p>
+            <a:pPr algn="ctr"/>
+            <a:endParaRPr lang="en-US"/>
+          </a:p>
+        </p:txBody>
+      </p:sp>
+      <p:sp>
+        <p:nvSpPr>
+          <p:cNvPr id="12" name="Oval 11">
+            <a:extLst>
+              <a:ext uri="{FF2B5EF4-FFF2-40B4-BE49-F238E27FC236}">
+                <a16:creationId xmlns:a16="http://schemas.microsoft.com/office/drawing/2014/main" id="{351A9CC0-F160-4DBA-97BA-E0733EB5E48E}"/>
+              </a:ext>
+            </a:extLst>
+          </p:cNvPr>
+          <p:cNvSpPr/>
+          <p:nvPr/>
+        </p:nvSpPr>
+        <p:spPr>
+          <a:xfrm>
+            <a:off x="8457105" y="5825920"/>
+            <a:ext cx="736600" cy="736600"/>
+          </a:xfrm>
+          <a:prstGeom prst="ellipse">
+            <a:avLst/>
+          </a:prstGeom>
+          <a:solidFill>
+            <a:srgbClr val="0D5427"/>
+          </a:solidFill>
+          <a:ln>
+            <a:solidFill>
+              <a:schemeClr val="tx1">
+                <a:lumMod val="95000"/>
+                <a:lumOff val="5000"/>
+              </a:schemeClr>
+            </a:solidFill>
+          </a:ln>
+        </p:spPr>
+        <p:style>
+          <a:lnRef idx="2">
+            <a:schemeClr val="accent1">
+              <a:shade val="50000"/>
+            </a:schemeClr>
+          </a:lnRef>
+          <a:fillRef idx="1">
+            <a:schemeClr val="accent1"/>
+          </a:fillRef>
+          <a:effectRef idx="0">
+            <a:schemeClr val="accent1"/>
+          </a:effectRef>
+          <a:fontRef idx="minor">
+            <a:schemeClr val="lt1"/>
+          </a:fontRef>
+        </p:style>
+        <p:txBody>
+          <a:bodyPr rtlCol="0" anchor="ctr"/>
+          <a:lstStyle/>
+          <a:p>
+            <a:pPr algn="ctr"/>
+            <a:endParaRPr lang="en-US"/>
+          </a:p>
+        </p:txBody>
+      </p:sp>
+      <p:pic>
+        <p:nvPicPr>
+          <p:cNvPr id="16" name="Picture 15" descr="Text&#10;&#10;Description automatically generated">
+            <a:extLst>
+              <a:ext uri="{FF2B5EF4-FFF2-40B4-BE49-F238E27FC236}">
+                <a16:creationId xmlns:a16="http://schemas.microsoft.com/office/drawing/2014/main" id="{6E86F256-E72A-4BDC-BF1E-44E352CB29AF}"/>
+              </a:ext>
+            </a:extLst>
+          </p:cNvPr>
+          <p:cNvPicPr>
+            <a:picLocks noChangeAspect="1"/>
+          </p:cNvPicPr>
+          <p:nvPr/>
+        </p:nvPicPr>
+        <p:blipFill rotWithShape="1">
+          <a:blip r:embed="rId3"/>
+          <a:srcRect t="19283" b="23633"/>
+          <a:stretch/>
+        </p:blipFill>
+        <p:spPr>
+          <a:xfrm>
+            <a:off x="8854692" y="1017525"/>
+            <a:ext cx="3226895" cy="999515"/>
+          </a:xfrm>
+          <a:prstGeom prst="rect">
+            <a:avLst/>
+          </a:prstGeom>
+        </p:spPr>
+      </p:pic>
+      <p:pic>
+        <p:nvPicPr>
+          <p:cNvPr id="17" name="Picture 16">
+            <a:extLst>
+              <a:ext uri="{FF2B5EF4-FFF2-40B4-BE49-F238E27FC236}">
+                <a16:creationId xmlns:a16="http://schemas.microsoft.com/office/drawing/2014/main" id="{D63D96A7-B91D-4251-A06D-75CF2BDD667A}"/>
+              </a:ext>
+            </a:extLst>
+          </p:cNvPr>
+          <p:cNvPicPr>
+            <a:picLocks noChangeAspect="1"/>
+          </p:cNvPicPr>
+          <p:nvPr/>
+        </p:nvPicPr>
+        <p:blipFill>
+          <a:blip r:embed="rId2"/>
+          <a:stretch>
+            <a:fillRect/>
+          </a:stretch>
+        </p:blipFill>
+        <p:spPr>
+          <a:xfrm>
+            <a:off x="8980644" y="1993785"/>
+            <a:ext cx="2661322" cy="838315"/>
+          </a:xfrm>
+          <a:prstGeom prst="rect">
+            <a:avLst/>
+          </a:prstGeom>
+        </p:spPr>
+      </p:pic>
     </p:spTree>
     <p:extLst>
       <p:ext uri="{BB962C8B-B14F-4D97-AF65-F5344CB8AC3E}">
         <p14:creationId xmlns:p14="http://schemas.microsoft.com/office/powerpoint/2010/main" val="2182904991"/>
+      </p:ext>
+    </p:extLst>
+  </p:cSld>
+  <p:clrMapOvr>
+    <a:masterClrMapping/>
+  </p:clrMapOvr>
+</p:sld>
+</file>
+
+<file path=ppt/slides/slide9.xml><?xml version="1.0" encoding="utf-8"?>
+<p:sld xmlns:a="http://schemas.openxmlformats.org/drawingml/2006/main" xmlns:r="http://schemas.openxmlformats.org/officeDocument/2006/relationships" xmlns:p="http://schemas.openxmlformats.org/presentationml/2006/main">
+  <p:cSld>
+    <p:bg>
+      <p:bgPr>
+        <a:solidFill>
+          <a:srgbClr val="222126"/>
+        </a:solidFill>
+        <a:effectLst/>
+      </p:bgPr>
+    </p:bg>
+    <p:spTree>
+      <p:nvGrpSpPr>
+        <p:cNvPr id="1" name=""/>
+        <p:cNvGrpSpPr/>
+        <p:nvPr/>
+      </p:nvGrpSpPr>
+      <p:grpSpPr>
+        <a:xfrm>
+          <a:off x="0" y="0"/>
+          <a:ext cx="0" cy="0"/>
+          <a:chOff x="0" y="0"/>
+          <a:chExt cx="0" cy="0"/>
+        </a:xfrm>
+      </p:grpSpPr>
+      <p:sp>
+        <p:nvSpPr>
+          <p:cNvPr id="2" name="Rectangle 1">
+            <a:extLst>
+              <a:ext uri="{FF2B5EF4-FFF2-40B4-BE49-F238E27FC236}">
+                <a16:creationId xmlns:a16="http://schemas.microsoft.com/office/drawing/2014/main" id="{BE29CBF1-0999-934D-9DE2-A920C68E8D03}"/>
+              </a:ext>
+            </a:extLst>
+          </p:cNvPr>
+          <p:cNvSpPr/>
+          <p:nvPr/>
+        </p:nvSpPr>
+        <p:spPr>
+          <a:xfrm>
+            <a:off x="0" y="48338"/>
+            <a:ext cx="11890515" cy="523220"/>
+          </a:xfrm>
+          <a:prstGeom prst="rect">
+            <a:avLst/>
+          </a:prstGeom>
+        </p:spPr>
+        <p:txBody>
+          <a:bodyPr wrap="square">
+            <a:spAutoFit/>
+          </a:bodyPr>
+          <a:lstStyle/>
+          <a:p>
+            <a:r>
+              <a:rPr lang="en-US" sz="2800" b="1" dirty="0">
+                <a:solidFill>
+                  <a:srgbClr val="9AF3A0"/>
+                </a:solidFill>
+                <a:latin typeface="Arial Nova" panose="020B0504020202020204" pitchFamily="34" charset="0"/>
+              </a:rPr>
+              <a:t>Title – Arial Nova</a:t>
+            </a:r>
+            <a:endParaRPr lang="en-US" sz="1600" dirty="0">
+              <a:solidFill>
+                <a:srgbClr val="9AF3A0"/>
+              </a:solidFill>
+              <a:latin typeface="Arial Nova" panose="020B0504020202020204" pitchFamily="34" charset="0"/>
+            </a:endParaRPr>
+          </a:p>
+        </p:txBody>
+      </p:sp>
+      <p:sp>
+        <p:nvSpPr>
+          <p:cNvPr id="6" name="Rounded Rectangle 5">
+            <a:extLst>
+              <a:ext uri="{FF2B5EF4-FFF2-40B4-BE49-F238E27FC236}">
+                <a16:creationId xmlns:a16="http://schemas.microsoft.com/office/drawing/2014/main" id="{D417003F-7960-F14A-99DE-574BCA69C207}"/>
+              </a:ext>
+            </a:extLst>
+          </p:cNvPr>
+          <p:cNvSpPr/>
+          <p:nvPr/>
+        </p:nvSpPr>
+        <p:spPr>
+          <a:xfrm>
+            <a:off x="103267" y="663780"/>
+            <a:ext cx="11871738" cy="45719"/>
+          </a:xfrm>
+          <a:prstGeom prst="roundRect">
+            <a:avLst/>
+          </a:prstGeom>
+          <a:solidFill>
+            <a:srgbClr val="9AF3A0"/>
+          </a:solidFill>
+          <a:ln>
+            <a:solidFill>
+              <a:srgbClr val="9AF3A0"/>
+            </a:solidFill>
+          </a:ln>
+        </p:spPr>
+        <p:style>
+          <a:lnRef idx="2">
+            <a:schemeClr val="accent1">
+              <a:shade val="50000"/>
+            </a:schemeClr>
+          </a:lnRef>
+          <a:fillRef idx="1">
+            <a:schemeClr val="accent1"/>
+          </a:fillRef>
+          <a:effectRef idx="0">
+            <a:schemeClr val="accent1"/>
+          </a:effectRef>
+          <a:fontRef idx="minor">
+            <a:schemeClr val="lt1"/>
+          </a:fontRef>
+        </p:style>
+        <p:txBody>
+          <a:bodyPr rtlCol="0" anchor="ctr"/>
+          <a:lstStyle/>
+          <a:p>
+            <a:pPr algn="ctr"/>
+            <a:endParaRPr lang="en-US">
+              <a:solidFill>
+                <a:srgbClr val="0D5427"/>
+              </a:solidFill>
+            </a:endParaRPr>
+          </a:p>
+        </p:txBody>
+      </p:sp>
+      <p:sp>
+        <p:nvSpPr>
+          <p:cNvPr id="7" name="Rectangle 6">
+            <a:extLst>
+              <a:ext uri="{FF2B5EF4-FFF2-40B4-BE49-F238E27FC236}">
+                <a16:creationId xmlns:a16="http://schemas.microsoft.com/office/drawing/2014/main" id="{ED3371D4-399C-4536-891A-01B2862ACA10}"/>
+              </a:ext>
+            </a:extLst>
+          </p:cNvPr>
+          <p:cNvSpPr/>
+          <p:nvPr/>
+        </p:nvSpPr>
+        <p:spPr>
+          <a:xfrm>
+            <a:off x="122045" y="816350"/>
+            <a:ext cx="1577446" cy="5943615"/>
+          </a:xfrm>
+          <a:prstGeom prst="rect">
+            <a:avLst/>
+          </a:prstGeom>
+          <a:solidFill>
+            <a:srgbClr val="49484E">
+              <a:alpha val="49804"/>
+            </a:srgbClr>
+          </a:solidFill>
+          <a:ln w="9525" cmpd="sng">
+            <a:solidFill>
+              <a:srgbClr val="9AF3A0">
+                <a:alpha val="99000"/>
+              </a:srgbClr>
+            </a:solidFill>
+            <a:bevel/>
+            <a:extLst>
+              <a:ext uri="{C807C97D-BFC1-408E-A445-0C87EB9F89A2}">
+                <ask:lineSketchStyleProps xmlns:ask="http://schemas.microsoft.com/office/drawing/2018/sketchyshapes" sd="1219033472">
+                  <a:custGeom>
+                    <a:avLst/>
+                    <a:gdLst>
+                      <a:gd name="connsiteX0" fmla="*/ 0 w 2116836"/>
+                      <a:gd name="connsiteY0" fmla="*/ 0 h 6261206"/>
+                      <a:gd name="connsiteX1" fmla="*/ 550377 w 2116836"/>
+                      <a:gd name="connsiteY1" fmla="*/ 0 h 6261206"/>
+                      <a:gd name="connsiteX2" fmla="*/ 1058418 w 2116836"/>
+                      <a:gd name="connsiteY2" fmla="*/ 0 h 6261206"/>
+                      <a:gd name="connsiteX3" fmla="*/ 1587627 w 2116836"/>
+                      <a:gd name="connsiteY3" fmla="*/ 0 h 6261206"/>
+                      <a:gd name="connsiteX4" fmla="*/ 2116836 w 2116836"/>
+                      <a:gd name="connsiteY4" fmla="*/ 0 h 6261206"/>
+                      <a:gd name="connsiteX5" fmla="*/ 2116836 w 2116836"/>
+                      <a:gd name="connsiteY5" fmla="*/ 443976 h 6261206"/>
+                      <a:gd name="connsiteX6" fmla="*/ 2116836 w 2116836"/>
+                      <a:gd name="connsiteY6" fmla="*/ 825341 h 6261206"/>
+                      <a:gd name="connsiteX7" fmla="*/ 2116836 w 2116836"/>
+                      <a:gd name="connsiteY7" fmla="*/ 1269317 h 6261206"/>
+                      <a:gd name="connsiteX8" fmla="*/ 2116836 w 2116836"/>
+                      <a:gd name="connsiteY8" fmla="*/ 1775906 h 6261206"/>
+                      <a:gd name="connsiteX9" fmla="*/ 2116836 w 2116836"/>
+                      <a:gd name="connsiteY9" fmla="*/ 2345106 h 6261206"/>
+                      <a:gd name="connsiteX10" fmla="*/ 2116836 w 2116836"/>
+                      <a:gd name="connsiteY10" fmla="*/ 2789083 h 6261206"/>
+                      <a:gd name="connsiteX11" fmla="*/ 2116836 w 2116836"/>
+                      <a:gd name="connsiteY11" fmla="*/ 3483507 h 6261206"/>
+                      <a:gd name="connsiteX12" fmla="*/ 2116836 w 2116836"/>
+                      <a:gd name="connsiteY12" fmla="*/ 4052708 h 6261206"/>
+                      <a:gd name="connsiteX13" fmla="*/ 2116836 w 2116836"/>
+                      <a:gd name="connsiteY13" fmla="*/ 4747133 h 6261206"/>
+                      <a:gd name="connsiteX14" fmla="*/ 2116836 w 2116836"/>
+                      <a:gd name="connsiteY14" fmla="*/ 5378945 h 6261206"/>
+                      <a:gd name="connsiteX15" fmla="*/ 2116836 w 2116836"/>
+                      <a:gd name="connsiteY15" fmla="*/ 6261206 h 6261206"/>
+                      <a:gd name="connsiteX16" fmla="*/ 1566459 w 2116836"/>
+                      <a:gd name="connsiteY16" fmla="*/ 6261206 h 6261206"/>
+                      <a:gd name="connsiteX17" fmla="*/ 1016081 w 2116836"/>
+                      <a:gd name="connsiteY17" fmla="*/ 6261206 h 6261206"/>
+                      <a:gd name="connsiteX18" fmla="*/ 486872 w 2116836"/>
+                      <a:gd name="connsiteY18" fmla="*/ 6261206 h 6261206"/>
+                      <a:gd name="connsiteX19" fmla="*/ 0 w 2116836"/>
+                      <a:gd name="connsiteY19" fmla="*/ 6261206 h 6261206"/>
+                      <a:gd name="connsiteX20" fmla="*/ 0 w 2116836"/>
+                      <a:gd name="connsiteY20" fmla="*/ 5566781 h 6261206"/>
+                      <a:gd name="connsiteX21" fmla="*/ 0 w 2116836"/>
+                      <a:gd name="connsiteY21" fmla="*/ 4872357 h 6261206"/>
+                      <a:gd name="connsiteX22" fmla="*/ 0 w 2116836"/>
+                      <a:gd name="connsiteY22" fmla="*/ 4303156 h 6261206"/>
+                      <a:gd name="connsiteX23" fmla="*/ 0 w 2116836"/>
+                      <a:gd name="connsiteY23" fmla="*/ 3671344 h 6261206"/>
+                      <a:gd name="connsiteX24" fmla="*/ 0 w 2116836"/>
+                      <a:gd name="connsiteY24" fmla="*/ 3102143 h 6261206"/>
+                      <a:gd name="connsiteX25" fmla="*/ 0 w 2116836"/>
+                      <a:gd name="connsiteY25" fmla="*/ 2532942 h 6261206"/>
+                      <a:gd name="connsiteX26" fmla="*/ 0 w 2116836"/>
+                      <a:gd name="connsiteY26" fmla="*/ 1963742 h 6261206"/>
+                      <a:gd name="connsiteX27" fmla="*/ 0 w 2116836"/>
+                      <a:gd name="connsiteY27" fmla="*/ 1582378 h 6261206"/>
+                      <a:gd name="connsiteX28" fmla="*/ 0 w 2116836"/>
+                      <a:gd name="connsiteY28" fmla="*/ 950565 h 6261206"/>
+                      <a:gd name="connsiteX29" fmla="*/ 0 w 2116836"/>
+                      <a:gd name="connsiteY29" fmla="*/ 569201 h 6261206"/>
+                      <a:gd name="connsiteX30" fmla="*/ 0 w 2116836"/>
+                      <a:gd name="connsiteY30" fmla="*/ 0 h 6261206"/>
+                    </a:gdLst>
+                    <a:ahLst/>
+                    <a:cxnLst>
+                      <a:cxn ang="0">
+                        <a:pos x="connsiteX0" y="connsiteY0"/>
+                      </a:cxn>
+                      <a:cxn ang="0">
+                        <a:pos x="connsiteX1" y="connsiteY1"/>
+                      </a:cxn>
+                      <a:cxn ang="0">
+                        <a:pos x="connsiteX2" y="connsiteY2"/>
+                      </a:cxn>
+                      <a:cxn ang="0">
+                        <a:pos x="connsiteX3" y="connsiteY3"/>
+                      </a:cxn>
+                      <a:cxn ang="0">
+                        <a:pos x="connsiteX4" y="connsiteY4"/>
+                      </a:cxn>
+                      <a:cxn ang="0">
+                        <a:pos x="connsiteX5" y="connsiteY5"/>
+                      </a:cxn>
+                      <a:cxn ang="0">
+                        <a:pos x="connsiteX6" y="connsiteY6"/>
+                      </a:cxn>
+                      <a:cxn ang="0">
+                        <a:pos x="connsiteX7" y="connsiteY7"/>
+                      </a:cxn>
+                      <a:cxn ang="0">
+                        <a:pos x="connsiteX8" y="connsiteY8"/>
+                      </a:cxn>
+                      <a:cxn ang="0">
+                        <a:pos x="connsiteX9" y="connsiteY9"/>
+                      </a:cxn>
+                      <a:cxn ang="0">
+                        <a:pos x="connsiteX10" y="connsiteY10"/>
+                      </a:cxn>
+                      <a:cxn ang="0">
+                        <a:pos x="connsiteX11" y="connsiteY11"/>
+                      </a:cxn>
+                      <a:cxn ang="0">
+                        <a:pos x="connsiteX12" y="connsiteY12"/>
+                      </a:cxn>
+                      <a:cxn ang="0">
+                        <a:pos x="connsiteX13" y="connsiteY13"/>
+                      </a:cxn>
+                      <a:cxn ang="0">
+                        <a:pos x="connsiteX14" y="connsiteY14"/>
+                      </a:cxn>
+                      <a:cxn ang="0">
+                        <a:pos x="connsiteX15" y="connsiteY15"/>
+                      </a:cxn>
+                      <a:cxn ang="0">
+                        <a:pos x="connsiteX16" y="connsiteY16"/>
+                      </a:cxn>
+                      <a:cxn ang="0">
+                        <a:pos x="connsiteX17" y="connsiteY17"/>
+                      </a:cxn>
+                      <a:cxn ang="0">
+                        <a:pos x="connsiteX18" y="connsiteY18"/>
+                      </a:cxn>
+                      <a:cxn ang="0">
+                        <a:pos x="connsiteX19" y="connsiteY19"/>
+                      </a:cxn>
+                      <a:cxn ang="0">
+                        <a:pos x="connsiteX20" y="connsiteY20"/>
+                      </a:cxn>
+                      <a:cxn ang="0">
+                        <a:pos x="connsiteX21" y="connsiteY21"/>
+                      </a:cxn>
+                      <a:cxn ang="0">
+                        <a:pos x="connsiteX22" y="connsiteY22"/>
+                      </a:cxn>
+                      <a:cxn ang="0">
+                        <a:pos x="connsiteX23" y="connsiteY23"/>
+                      </a:cxn>
+                      <a:cxn ang="0">
+                        <a:pos x="connsiteX24" y="connsiteY24"/>
+                      </a:cxn>
+                      <a:cxn ang="0">
+                        <a:pos x="connsiteX25" y="connsiteY25"/>
+                      </a:cxn>
+                      <a:cxn ang="0">
+                        <a:pos x="connsiteX26" y="connsiteY26"/>
+                      </a:cxn>
+                      <a:cxn ang="0">
+                        <a:pos x="connsiteX27" y="connsiteY27"/>
+                      </a:cxn>
+                      <a:cxn ang="0">
+                        <a:pos x="connsiteX28" y="connsiteY28"/>
+                      </a:cxn>
+                      <a:cxn ang="0">
+                        <a:pos x="connsiteX29" y="connsiteY29"/>
+                      </a:cxn>
+                      <a:cxn ang="0">
+                        <a:pos x="connsiteX30" y="connsiteY30"/>
+                      </a:cxn>
+                    </a:cxnLst>
+                    <a:rect l="l" t="t" r="r" b="b"/>
+                    <a:pathLst>
+                      <a:path w="2116836" h="6261206" fill="none" extrusionOk="0">
+                        <a:moveTo>
+                          <a:pt x="0" y="0"/>
+                        </a:moveTo>
+                        <a:cubicBezTo>
+                          <a:pt x="225918" y="-34016"/>
+                          <a:pt x="395079" y="44159"/>
+                          <a:pt x="550377" y="0"/>
+                        </a:cubicBezTo>
+                        <a:cubicBezTo>
+                          <a:pt x="705675" y="-44159"/>
+                          <a:pt x="925264" y="18151"/>
+                          <a:pt x="1058418" y="0"/>
+                        </a:cubicBezTo>
+                        <a:cubicBezTo>
+                          <a:pt x="1191572" y="-18151"/>
+                          <a:pt x="1363242" y="33856"/>
+                          <a:pt x="1587627" y="0"/>
+                        </a:cubicBezTo>
+                        <a:cubicBezTo>
+                          <a:pt x="1812012" y="-33856"/>
+                          <a:pt x="1878985" y="29310"/>
+                          <a:pt x="2116836" y="0"/>
+                        </a:cubicBezTo>
+                        <a:cubicBezTo>
+                          <a:pt x="2159368" y="204024"/>
+                          <a:pt x="2101610" y="287280"/>
+                          <a:pt x="2116836" y="443976"/>
+                        </a:cubicBezTo>
+                        <a:cubicBezTo>
+                          <a:pt x="2132062" y="600672"/>
+                          <a:pt x="2115766" y="667996"/>
+                          <a:pt x="2116836" y="825341"/>
+                        </a:cubicBezTo>
+                        <a:cubicBezTo>
+                          <a:pt x="2117906" y="982686"/>
+                          <a:pt x="2077803" y="1120058"/>
+                          <a:pt x="2116836" y="1269317"/>
+                        </a:cubicBezTo>
+                        <a:cubicBezTo>
+                          <a:pt x="2155869" y="1418576"/>
+                          <a:pt x="2114106" y="1588629"/>
+                          <a:pt x="2116836" y="1775906"/>
+                        </a:cubicBezTo>
+                        <a:cubicBezTo>
+                          <a:pt x="2119566" y="1963183"/>
+                          <a:pt x="2101020" y="2128890"/>
+                          <a:pt x="2116836" y="2345106"/>
+                        </a:cubicBezTo>
+                        <a:cubicBezTo>
+                          <a:pt x="2132652" y="2561322"/>
+                          <a:pt x="2115868" y="2574478"/>
+                          <a:pt x="2116836" y="2789083"/>
+                        </a:cubicBezTo>
+                        <a:cubicBezTo>
+                          <a:pt x="2117804" y="3003688"/>
+                          <a:pt x="2062089" y="3302658"/>
+                          <a:pt x="2116836" y="3483507"/>
+                        </a:cubicBezTo>
+                        <a:cubicBezTo>
+                          <a:pt x="2171583" y="3664356"/>
+                          <a:pt x="2101663" y="3831819"/>
+                          <a:pt x="2116836" y="4052708"/>
+                        </a:cubicBezTo>
+                        <a:cubicBezTo>
+                          <a:pt x="2132009" y="4273597"/>
+                          <a:pt x="2055702" y="4456217"/>
+                          <a:pt x="2116836" y="4747133"/>
+                        </a:cubicBezTo>
+                        <a:cubicBezTo>
+                          <a:pt x="2177970" y="5038050"/>
+                          <a:pt x="2068871" y="5192335"/>
+                          <a:pt x="2116836" y="5378945"/>
+                        </a:cubicBezTo>
+                        <a:cubicBezTo>
+                          <a:pt x="2164801" y="5565555"/>
+                          <a:pt x="2064795" y="6030993"/>
+                          <a:pt x="2116836" y="6261206"/>
+                        </a:cubicBezTo>
+                        <a:cubicBezTo>
+                          <a:pt x="1928233" y="6278718"/>
+                          <a:pt x="1685770" y="6219426"/>
+                          <a:pt x="1566459" y="6261206"/>
+                        </a:cubicBezTo>
+                        <a:cubicBezTo>
+                          <a:pt x="1447148" y="6302986"/>
+                          <a:pt x="1203439" y="6244651"/>
+                          <a:pt x="1016081" y="6261206"/>
+                        </a:cubicBezTo>
+                        <a:cubicBezTo>
+                          <a:pt x="828723" y="6277761"/>
+                          <a:pt x="593713" y="6201409"/>
+                          <a:pt x="486872" y="6261206"/>
+                        </a:cubicBezTo>
+                        <a:cubicBezTo>
+                          <a:pt x="380031" y="6321003"/>
+                          <a:pt x="120721" y="6219335"/>
+                          <a:pt x="0" y="6261206"/>
+                        </a:cubicBezTo>
+                        <a:cubicBezTo>
+                          <a:pt x="-22346" y="6029246"/>
+                          <a:pt x="71141" y="5860547"/>
+                          <a:pt x="0" y="5566781"/>
+                        </a:cubicBezTo>
+                        <a:cubicBezTo>
+                          <a:pt x="-71141" y="5273016"/>
+                          <a:pt x="69428" y="5078049"/>
+                          <a:pt x="0" y="4872357"/>
+                        </a:cubicBezTo>
+                        <a:cubicBezTo>
+                          <a:pt x="-69428" y="4666665"/>
+                          <a:pt x="63076" y="4570884"/>
+                          <a:pt x="0" y="4303156"/>
+                        </a:cubicBezTo>
+                        <a:cubicBezTo>
+                          <a:pt x="-63076" y="4035428"/>
+                          <a:pt x="32504" y="3819356"/>
+                          <a:pt x="0" y="3671344"/>
+                        </a:cubicBezTo>
+                        <a:cubicBezTo>
+                          <a:pt x="-32504" y="3523332"/>
+                          <a:pt x="17503" y="3348248"/>
+                          <a:pt x="0" y="3102143"/>
+                        </a:cubicBezTo>
+                        <a:cubicBezTo>
+                          <a:pt x="-17503" y="2856038"/>
+                          <a:pt x="21591" y="2763441"/>
+                          <a:pt x="0" y="2532942"/>
+                        </a:cubicBezTo>
+                        <a:cubicBezTo>
+                          <a:pt x="-21591" y="2302443"/>
+                          <a:pt x="68254" y="2235060"/>
+                          <a:pt x="0" y="1963742"/>
+                        </a:cubicBezTo>
+                        <a:cubicBezTo>
+                          <a:pt x="-68254" y="1692424"/>
+                          <a:pt x="10005" y="1754039"/>
+                          <a:pt x="0" y="1582378"/>
+                        </a:cubicBezTo>
+                        <a:cubicBezTo>
+                          <a:pt x="-10005" y="1410717"/>
+                          <a:pt x="60088" y="1252307"/>
+                          <a:pt x="0" y="950565"/>
+                        </a:cubicBezTo>
+                        <a:cubicBezTo>
+                          <a:pt x="-60088" y="648823"/>
+                          <a:pt x="43154" y="738812"/>
+                          <a:pt x="0" y="569201"/>
+                        </a:cubicBezTo>
+                        <a:cubicBezTo>
+                          <a:pt x="-43154" y="399590"/>
+                          <a:pt x="3087" y="259507"/>
+                          <a:pt x="0" y="0"/>
+                        </a:cubicBezTo>
+                        <a:close/>
+                      </a:path>
+                      <a:path w="2116836" h="6261206" stroke="0" extrusionOk="0">
+                        <a:moveTo>
+                          <a:pt x="0" y="0"/>
+                        </a:moveTo>
+                        <a:cubicBezTo>
+                          <a:pt x="194979" y="-17842"/>
+                          <a:pt x="275613" y="24047"/>
+                          <a:pt x="508041" y="0"/>
+                        </a:cubicBezTo>
+                        <a:cubicBezTo>
+                          <a:pt x="740469" y="-24047"/>
+                          <a:pt x="797934" y="16205"/>
+                          <a:pt x="973745" y="0"/>
+                        </a:cubicBezTo>
+                        <a:cubicBezTo>
+                          <a:pt x="1149556" y="-16205"/>
+                          <a:pt x="1311326" y="51706"/>
+                          <a:pt x="1545290" y="0"/>
+                        </a:cubicBezTo>
+                        <a:cubicBezTo>
+                          <a:pt x="1779254" y="-51706"/>
+                          <a:pt x="1839294" y="59057"/>
+                          <a:pt x="2116836" y="0"/>
+                        </a:cubicBezTo>
+                        <a:cubicBezTo>
+                          <a:pt x="2125097" y="190710"/>
+                          <a:pt x="2113017" y="356820"/>
+                          <a:pt x="2116836" y="506588"/>
+                        </a:cubicBezTo>
+                        <a:cubicBezTo>
+                          <a:pt x="2120655" y="656356"/>
+                          <a:pt x="2081267" y="797988"/>
+                          <a:pt x="2116836" y="950565"/>
+                        </a:cubicBezTo>
+                        <a:cubicBezTo>
+                          <a:pt x="2152405" y="1103142"/>
+                          <a:pt x="2084051" y="1404827"/>
+                          <a:pt x="2116836" y="1519765"/>
+                        </a:cubicBezTo>
+                        <a:cubicBezTo>
+                          <a:pt x="2149621" y="1634703"/>
+                          <a:pt x="2108642" y="1816681"/>
+                          <a:pt x="2116836" y="2088966"/>
+                        </a:cubicBezTo>
+                        <a:cubicBezTo>
+                          <a:pt x="2125030" y="2361251"/>
+                          <a:pt x="2083755" y="2326902"/>
+                          <a:pt x="2116836" y="2532942"/>
+                        </a:cubicBezTo>
+                        <a:cubicBezTo>
+                          <a:pt x="2149917" y="2738982"/>
+                          <a:pt x="2084942" y="2880121"/>
+                          <a:pt x="2116836" y="2976919"/>
+                        </a:cubicBezTo>
+                        <a:cubicBezTo>
+                          <a:pt x="2148730" y="3073717"/>
+                          <a:pt x="2066025" y="3261988"/>
+                          <a:pt x="2116836" y="3546119"/>
+                        </a:cubicBezTo>
+                        <a:cubicBezTo>
+                          <a:pt x="2167647" y="3830250"/>
+                          <a:pt x="2056171" y="3975028"/>
+                          <a:pt x="2116836" y="4177932"/>
+                        </a:cubicBezTo>
+                        <a:cubicBezTo>
+                          <a:pt x="2177501" y="4380836"/>
+                          <a:pt x="2110320" y="4401695"/>
+                          <a:pt x="2116836" y="4559296"/>
+                        </a:cubicBezTo>
+                        <a:cubicBezTo>
+                          <a:pt x="2123352" y="4716897"/>
+                          <a:pt x="2106247" y="4909785"/>
+                          <a:pt x="2116836" y="5128497"/>
+                        </a:cubicBezTo>
+                        <a:cubicBezTo>
+                          <a:pt x="2127425" y="5347209"/>
+                          <a:pt x="2070713" y="5463623"/>
+                          <a:pt x="2116836" y="5697697"/>
+                        </a:cubicBezTo>
+                        <a:cubicBezTo>
+                          <a:pt x="2162959" y="5931771"/>
+                          <a:pt x="2065839" y="5991022"/>
+                          <a:pt x="2116836" y="6261206"/>
+                        </a:cubicBezTo>
+                        <a:cubicBezTo>
+                          <a:pt x="1993577" y="6323026"/>
+                          <a:pt x="1833543" y="6207492"/>
+                          <a:pt x="1566459" y="6261206"/>
+                        </a:cubicBezTo>
+                        <a:cubicBezTo>
+                          <a:pt x="1299375" y="6314920"/>
+                          <a:pt x="1184532" y="6197961"/>
+                          <a:pt x="1037250" y="6261206"/>
+                        </a:cubicBezTo>
+                        <a:cubicBezTo>
+                          <a:pt x="889968" y="6324451"/>
+                          <a:pt x="675538" y="6260177"/>
+                          <a:pt x="571546" y="6261206"/>
+                        </a:cubicBezTo>
+                        <a:cubicBezTo>
+                          <a:pt x="467554" y="6262235"/>
+                          <a:pt x="125534" y="6241738"/>
+                          <a:pt x="0" y="6261206"/>
+                        </a:cubicBezTo>
+                        <a:cubicBezTo>
+                          <a:pt x="-57040" y="6099636"/>
+                          <a:pt x="2135" y="5712203"/>
+                          <a:pt x="0" y="5566781"/>
+                        </a:cubicBezTo>
+                        <a:cubicBezTo>
+                          <a:pt x="-2135" y="5421359"/>
+                          <a:pt x="37294" y="5021150"/>
+                          <a:pt x="0" y="4872357"/>
+                        </a:cubicBezTo>
+                        <a:cubicBezTo>
+                          <a:pt x="-37294" y="4723564"/>
+                          <a:pt x="7798" y="4522358"/>
+                          <a:pt x="0" y="4303156"/>
+                        </a:cubicBezTo>
+                        <a:cubicBezTo>
+                          <a:pt x="-7798" y="4083954"/>
+                          <a:pt x="58613" y="4042155"/>
+                          <a:pt x="0" y="3796568"/>
+                        </a:cubicBezTo>
+                        <a:cubicBezTo>
+                          <a:pt x="-58613" y="3550981"/>
+                          <a:pt x="26008" y="3516111"/>
+                          <a:pt x="0" y="3415203"/>
+                        </a:cubicBezTo>
+                        <a:cubicBezTo>
+                          <a:pt x="-26008" y="3314296"/>
+                          <a:pt x="40033" y="3189905"/>
+                          <a:pt x="0" y="3033839"/>
+                        </a:cubicBezTo>
+                        <a:cubicBezTo>
+                          <a:pt x="-40033" y="2877773"/>
+                          <a:pt x="40622" y="2657965"/>
+                          <a:pt x="0" y="2402026"/>
+                        </a:cubicBezTo>
+                        <a:cubicBezTo>
+                          <a:pt x="-40622" y="2146087"/>
+                          <a:pt x="50341" y="2089474"/>
+                          <a:pt x="0" y="1958050"/>
+                        </a:cubicBezTo>
+                        <a:cubicBezTo>
+                          <a:pt x="-50341" y="1826626"/>
+                          <a:pt x="11843" y="1502672"/>
+                          <a:pt x="0" y="1263625"/>
+                        </a:cubicBezTo>
+                        <a:cubicBezTo>
+                          <a:pt x="-11843" y="1024579"/>
+                          <a:pt x="9227" y="897968"/>
+                          <a:pt x="0" y="757037"/>
+                        </a:cubicBezTo>
+                        <a:cubicBezTo>
+                          <a:pt x="-9227" y="616106"/>
+                          <a:pt x="36062" y="292523"/>
+                          <a:pt x="0" y="0"/>
+                        </a:cubicBezTo>
+                        <a:close/>
+                      </a:path>
+                    </a:pathLst>
+                  </a:custGeom>
+                  <ask:type>
+                    <ask:lineSketchNone/>
+                  </ask:type>
+                </ask:lineSketchStyleProps>
+              </a:ext>
+            </a:extLst>
+          </a:ln>
+          <a:effectLst>
+            <a:outerShdw blurRad="50800" dist="38100" dir="2700000" algn="tl" rotWithShape="0">
+              <a:prstClr val="black">
+                <a:alpha val="18000"/>
+              </a:prstClr>
+            </a:outerShdw>
+          </a:effectLst>
+        </p:spPr>
+        <p:style>
+          <a:lnRef idx="0">
+            <a:scrgbClr r="0" g="0" b="0"/>
+          </a:lnRef>
+          <a:fillRef idx="0">
+            <a:scrgbClr r="0" g="0" b="0"/>
+          </a:fillRef>
+          <a:effectRef idx="0">
+            <a:scrgbClr r="0" g="0" b="0"/>
+          </a:effectRef>
+          <a:fontRef idx="minor">
+            <a:schemeClr val="lt1"/>
+          </a:fontRef>
+        </p:style>
+        <p:txBody>
+          <a:bodyPr rtlCol="0" anchor="ctr"/>
+          <a:lstStyle/>
+          <a:p>
+            <a:pPr algn="ctr"/>
+            <a:endParaRPr lang="en-US" b="1" spc="50" dirty="0">
+              <a:ln w="0"/>
+              <a:solidFill>
+                <a:schemeClr val="bg2"/>
+              </a:solidFill>
+              <a:effectLst>
+                <a:innerShdw blurRad="63500" dist="50800" dir="13500000">
+                  <a:srgbClr val="000000">
+                    <a:alpha val="50000"/>
+                  </a:srgbClr>
+                </a:innerShdw>
+              </a:effectLst>
+              <a:latin typeface="Arial Nova" panose="020B0504020202020204" pitchFamily="34" charset="0"/>
+            </a:endParaRPr>
+          </a:p>
+        </p:txBody>
+      </p:sp>
+      <p:sp>
+        <p:nvSpPr>
+          <p:cNvPr id="8" name="Rectangle 7">
+            <a:extLst>
+              <a:ext uri="{FF2B5EF4-FFF2-40B4-BE49-F238E27FC236}">
+                <a16:creationId xmlns:a16="http://schemas.microsoft.com/office/drawing/2014/main" id="{079448C9-2A66-4E3B-AAC2-8BB995AF1DB0}"/>
+              </a:ext>
+            </a:extLst>
+          </p:cNvPr>
+          <p:cNvSpPr/>
+          <p:nvPr/>
+        </p:nvSpPr>
+        <p:spPr>
+          <a:xfrm>
+            <a:off x="122045" y="816350"/>
+            <a:ext cx="1577446" cy="923330"/>
+          </a:xfrm>
+          <a:prstGeom prst="rect">
+            <a:avLst/>
+          </a:prstGeom>
+        </p:spPr>
+        <p:txBody>
+          <a:bodyPr wrap="square">
+            <a:spAutoFit/>
+          </a:bodyPr>
+          <a:lstStyle/>
+          <a:p>
+            <a:r>
+              <a:rPr lang="en-US" sz="1600" i="0" u="none" strike="noStrike" dirty="0">
+                <a:solidFill>
+                  <a:srgbClr val="9AF3A0"/>
+                </a:solidFill>
+                <a:effectLst/>
+                <a:latin typeface="Arial Nova" panose="020F0502020204030204" pitchFamily="34" charset="0"/>
+              </a:rPr>
+              <a:t>Outline</a:t>
+            </a:r>
+          </a:p>
+          <a:p>
+            <a:pPr marL="171450" indent="-171450">
+              <a:buFont typeface="Arial" panose="020B0604020202020204" pitchFamily="34" charset="0"/>
+              <a:buChar char="•"/>
+            </a:pPr>
+            <a:r>
+              <a:rPr lang="en-US" sz="1200" dirty="0">
+                <a:solidFill>
+                  <a:srgbClr val="9AF3A0"/>
+                </a:solidFill>
+                <a:latin typeface="Arial Nova" panose="020F0502020204030204" pitchFamily="34" charset="0"/>
+              </a:rPr>
+              <a:t>Bullet one</a:t>
+            </a:r>
+          </a:p>
+          <a:p>
+            <a:pPr marL="171450" indent="-171450">
+              <a:buFont typeface="Arial" panose="020B0604020202020204" pitchFamily="34" charset="0"/>
+              <a:buChar char="•"/>
+            </a:pPr>
+            <a:r>
+              <a:rPr lang="en-US" sz="1200" dirty="0">
+                <a:solidFill>
+                  <a:srgbClr val="9AF3A0"/>
+                </a:solidFill>
+                <a:latin typeface="Arial Nova" panose="020F0502020204030204" pitchFamily="34" charset="0"/>
+              </a:rPr>
+              <a:t>Bullet 2</a:t>
+            </a:r>
+          </a:p>
+          <a:p>
+            <a:endParaRPr lang="en-US" sz="1400" i="0" u="none" strike="noStrike" dirty="0">
+              <a:effectLst/>
+              <a:latin typeface="Arial Nova" panose="020F0502020204030204" pitchFamily="34" charset="0"/>
+            </a:endParaRPr>
+          </a:p>
+        </p:txBody>
+      </p:sp>
+      <p:pic>
+        <p:nvPicPr>
+          <p:cNvPr id="4" name="Picture 3">
+            <a:extLst>
+              <a:ext uri="{FF2B5EF4-FFF2-40B4-BE49-F238E27FC236}">
+                <a16:creationId xmlns:a16="http://schemas.microsoft.com/office/drawing/2014/main" id="{2CE627D6-6379-4981-945C-316C8713B935}"/>
+              </a:ext>
+            </a:extLst>
+          </p:cNvPr>
+          <p:cNvPicPr>
+            <a:picLocks noChangeAspect="1"/>
+          </p:cNvPicPr>
+          <p:nvPr/>
+        </p:nvPicPr>
+        <p:blipFill rotWithShape="1">
+          <a:blip r:embed="rId2"/>
+          <a:srcRect t="12472" b="23511"/>
+          <a:stretch/>
+        </p:blipFill>
+        <p:spPr>
+          <a:xfrm>
+            <a:off x="10219116" y="5185"/>
+            <a:ext cx="1755889" cy="609525"/>
+          </a:xfrm>
+          <a:prstGeom prst="rect">
+            <a:avLst/>
+          </a:prstGeom>
+        </p:spPr>
+      </p:pic>
+      <p:pic>
+        <p:nvPicPr>
+          <p:cNvPr id="9" name="Picture 8">
+            <a:extLst>
+              <a:ext uri="{FF2B5EF4-FFF2-40B4-BE49-F238E27FC236}">
+                <a16:creationId xmlns:a16="http://schemas.microsoft.com/office/drawing/2014/main" id="{FF23FE58-947B-40A3-86DE-F222EFFAB6F9}"/>
+              </a:ext>
+            </a:extLst>
+          </p:cNvPr>
+          <p:cNvPicPr>
+            <a:picLocks noChangeAspect="1"/>
+          </p:cNvPicPr>
+          <p:nvPr/>
+        </p:nvPicPr>
+        <p:blipFill rotWithShape="1">
+          <a:blip r:embed="rId3"/>
+          <a:srcRect l="5729" t="22952" r="7291" b="27255"/>
+          <a:stretch/>
+        </p:blipFill>
+        <p:spPr>
+          <a:xfrm>
+            <a:off x="8737599" y="1004812"/>
+            <a:ext cx="3332355" cy="1034428"/>
+          </a:xfrm>
+          <a:prstGeom prst="rect">
+            <a:avLst/>
+          </a:prstGeom>
+        </p:spPr>
+      </p:pic>
+      <p:pic>
+        <p:nvPicPr>
+          <p:cNvPr id="11" name="Picture 10">
+            <a:extLst>
+              <a:ext uri="{FF2B5EF4-FFF2-40B4-BE49-F238E27FC236}">
+                <a16:creationId xmlns:a16="http://schemas.microsoft.com/office/drawing/2014/main" id="{CC999A55-F2BA-456B-B0DB-9ED093657FCF}"/>
+              </a:ext>
+            </a:extLst>
+          </p:cNvPr>
+          <p:cNvPicPr>
+            <a:picLocks noChangeAspect="1"/>
+          </p:cNvPicPr>
+          <p:nvPr/>
+        </p:nvPicPr>
+        <p:blipFill rotWithShape="1">
+          <a:blip r:embed="rId2"/>
+          <a:srcRect t="12472" b="23511"/>
+          <a:stretch/>
+        </p:blipFill>
+        <p:spPr>
+          <a:xfrm>
+            <a:off x="8635999" y="2102740"/>
+            <a:ext cx="3526417" cy="1224132"/>
+          </a:xfrm>
+          <a:prstGeom prst="rect">
+            <a:avLst/>
+          </a:prstGeom>
+        </p:spPr>
+      </p:pic>
+      <p:sp>
+        <p:nvSpPr>
+          <p:cNvPr id="10" name="Oval 9">
+            <a:extLst>
+              <a:ext uri="{FF2B5EF4-FFF2-40B4-BE49-F238E27FC236}">
+                <a16:creationId xmlns:a16="http://schemas.microsoft.com/office/drawing/2014/main" id="{0BFDA9CB-F4F0-43B2-BF0F-4D54E11A56E0}"/>
+              </a:ext>
+            </a:extLst>
+          </p:cNvPr>
+          <p:cNvSpPr/>
+          <p:nvPr/>
+        </p:nvSpPr>
+        <p:spPr>
+          <a:xfrm>
+            <a:off x="9271575" y="3788157"/>
+            <a:ext cx="736600" cy="736600"/>
+          </a:xfrm>
+          <a:prstGeom prst="ellipse">
+            <a:avLst/>
+          </a:prstGeom>
+          <a:solidFill>
+            <a:srgbClr val="9AF3A0"/>
+          </a:solidFill>
+          <a:ln>
+            <a:solidFill>
+              <a:srgbClr val="9AF3A0"/>
+            </a:solidFill>
+          </a:ln>
+        </p:spPr>
+        <p:style>
+          <a:lnRef idx="2">
+            <a:schemeClr val="accent1">
+              <a:shade val="50000"/>
+            </a:schemeClr>
+          </a:lnRef>
+          <a:fillRef idx="1">
+            <a:schemeClr val="accent1"/>
+          </a:fillRef>
+          <a:effectRef idx="0">
+            <a:schemeClr val="accent1"/>
+          </a:effectRef>
+          <a:fontRef idx="minor">
+            <a:schemeClr val="lt1"/>
+          </a:fontRef>
+        </p:style>
+        <p:txBody>
+          <a:bodyPr rtlCol="0" anchor="ctr"/>
+          <a:lstStyle/>
+          <a:p>
+            <a:pPr algn="ctr"/>
+            <a:endParaRPr lang="en-US">
+              <a:solidFill>
+                <a:srgbClr val="72EE7B"/>
+              </a:solidFill>
+            </a:endParaRPr>
+          </a:p>
+        </p:txBody>
+      </p:sp>
+      <p:sp>
+        <p:nvSpPr>
+          <p:cNvPr id="13" name="Oval 12">
+            <a:extLst>
+              <a:ext uri="{FF2B5EF4-FFF2-40B4-BE49-F238E27FC236}">
+                <a16:creationId xmlns:a16="http://schemas.microsoft.com/office/drawing/2014/main" id="{0094C4A6-AB88-4BB3-B0FB-E492537D5B55}"/>
+              </a:ext>
+            </a:extLst>
+          </p:cNvPr>
+          <p:cNvSpPr/>
+          <p:nvPr/>
+        </p:nvSpPr>
+        <p:spPr>
+          <a:xfrm>
+            <a:off x="10198675" y="3788157"/>
+            <a:ext cx="736600" cy="736600"/>
+          </a:xfrm>
+          <a:prstGeom prst="ellipse">
+            <a:avLst/>
+          </a:prstGeom>
+          <a:solidFill>
+            <a:srgbClr val="B09CE8"/>
+          </a:solidFill>
+          <a:ln>
+            <a:solidFill>
+              <a:srgbClr val="B09CE8"/>
+            </a:solidFill>
+          </a:ln>
+        </p:spPr>
+        <p:style>
+          <a:lnRef idx="2">
+            <a:schemeClr val="accent1">
+              <a:shade val="50000"/>
+            </a:schemeClr>
+          </a:lnRef>
+          <a:fillRef idx="1">
+            <a:schemeClr val="accent1"/>
+          </a:fillRef>
+          <a:effectRef idx="0">
+            <a:schemeClr val="accent1"/>
+          </a:effectRef>
+          <a:fontRef idx="minor">
+            <a:schemeClr val="lt1"/>
+          </a:fontRef>
+        </p:style>
+        <p:txBody>
+          <a:bodyPr rtlCol="0" anchor="ctr"/>
+          <a:lstStyle/>
+          <a:p>
+            <a:pPr algn="ctr"/>
+            <a:endParaRPr lang="en-US"/>
+          </a:p>
+        </p:txBody>
+      </p:sp>
+      <p:sp>
+        <p:nvSpPr>
+          <p:cNvPr id="14" name="Oval 13">
+            <a:extLst>
+              <a:ext uri="{FF2B5EF4-FFF2-40B4-BE49-F238E27FC236}">
+                <a16:creationId xmlns:a16="http://schemas.microsoft.com/office/drawing/2014/main" id="{29FB5C7A-68A0-49A8-A20A-DCDF3651CC37}"/>
+              </a:ext>
+            </a:extLst>
+          </p:cNvPr>
+          <p:cNvSpPr/>
+          <p:nvPr/>
+        </p:nvSpPr>
+        <p:spPr>
+          <a:xfrm>
+            <a:off x="11125775" y="3788157"/>
+            <a:ext cx="736600" cy="736600"/>
+          </a:xfrm>
+          <a:prstGeom prst="ellipse">
+            <a:avLst/>
+          </a:prstGeom>
+          <a:solidFill>
+            <a:srgbClr val="DC348C"/>
+          </a:solidFill>
+          <a:ln>
+            <a:solidFill>
+              <a:srgbClr val="DC348C"/>
+            </a:solidFill>
+          </a:ln>
+        </p:spPr>
+        <p:style>
+          <a:lnRef idx="2">
+            <a:schemeClr val="accent1">
+              <a:shade val="50000"/>
+            </a:schemeClr>
+          </a:lnRef>
+          <a:fillRef idx="1">
+            <a:schemeClr val="accent1"/>
+          </a:fillRef>
+          <a:effectRef idx="0">
+            <a:schemeClr val="accent1"/>
+          </a:effectRef>
+          <a:fontRef idx="minor">
+            <a:schemeClr val="lt1"/>
+          </a:fontRef>
+        </p:style>
+        <p:txBody>
+          <a:bodyPr rtlCol="0" anchor="ctr"/>
+          <a:lstStyle/>
+          <a:p>
+            <a:pPr algn="ctr"/>
+            <a:endParaRPr lang="en-US"/>
+          </a:p>
+        </p:txBody>
+      </p:sp>
+      <p:sp>
+        <p:nvSpPr>
+          <p:cNvPr id="15" name="Oval 14">
+            <a:extLst>
+              <a:ext uri="{FF2B5EF4-FFF2-40B4-BE49-F238E27FC236}">
+                <a16:creationId xmlns:a16="http://schemas.microsoft.com/office/drawing/2014/main" id="{D0E455B9-D4EA-43BF-A64E-CD074309CED9}"/>
+              </a:ext>
+            </a:extLst>
+          </p:cNvPr>
+          <p:cNvSpPr/>
+          <p:nvPr/>
+        </p:nvSpPr>
+        <p:spPr>
+          <a:xfrm>
+            <a:off x="8344475" y="3788157"/>
+            <a:ext cx="736600" cy="736600"/>
+          </a:xfrm>
+          <a:prstGeom prst="ellipse">
+            <a:avLst/>
+          </a:prstGeom>
+          <a:solidFill>
+            <a:srgbClr val="00D7D1"/>
+          </a:solidFill>
+          <a:ln>
+            <a:solidFill>
+              <a:srgbClr val="00D7D1"/>
+            </a:solidFill>
+          </a:ln>
+        </p:spPr>
+        <p:style>
+          <a:lnRef idx="2">
+            <a:schemeClr val="accent1">
+              <a:shade val="50000"/>
+            </a:schemeClr>
+          </a:lnRef>
+          <a:fillRef idx="1">
+            <a:schemeClr val="accent1"/>
+          </a:fillRef>
+          <a:effectRef idx="0">
+            <a:schemeClr val="accent1"/>
+          </a:effectRef>
+          <a:fontRef idx="minor">
+            <a:schemeClr val="lt1"/>
+          </a:fontRef>
+        </p:style>
+        <p:txBody>
+          <a:bodyPr rtlCol="0" anchor="ctr"/>
+          <a:lstStyle/>
+          <a:p>
+            <a:pPr algn="ctr"/>
+            <a:endParaRPr lang="en-US"/>
+          </a:p>
+        </p:txBody>
+      </p:sp>
+    </p:spTree>
+    <p:extLst>
+      <p:ext uri="{BB962C8B-B14F-4D97-AF65-F5344CB8AC3E}">
+        <p14:creationId xmlns:p14="http://schemas.microsoft.com/office/powerpoint/2010/main" val="3393955208"/>
       </p:ext>
     </p:extLst>
   </p:cSld>

</xml_diff>